<commit_message>
Edit survey report on Connected components problem
</commit_message>
<xml_diff>
--- a/2017/GT/SmirenkoKirill/Connected components.pptx
+++ b/2017/GT/SmirenkoKirill/Connected components.pptx
@@ -5,7 +5,7 @@
     <p:sldMasterId id="2147483659" r:id="rId1"/>
   </p:sldMasterIdLst>
   <p:notesMasterIdLst>
-    <p:notesMasterId r:id="rId13"/>
+    <p:notesMasterId r:id="rId14"/>
   </p:notesMasterIdLst>
   <p:sldIdLst>
     <p:sldId id="256" r:id="rId2"/>
@@ -19,14 +19,15 @@
     <p:sldId id="264" r:id="rId10"/>
     <p:sldId id="265" r:id="rId11"/>
     <p:sldId id="266" r:id="rId12"/>
+    <p:sldId id="267" r:id="rId13"/>
   </p:sldIdLst>
   <p:sldSz cx="9144000" cy="5143500" type="screen16x9"/>
   <p:notesSz cx="6858000" cy="9144000"/>
   <p:embeddedFontLst>
     <p:embeddedFont>
       <p:font typeface="Tahoma" panose="020B0604030504040204" pitchFamily="34" charset="0"/>
-      <p:regular r:id="rId14"/>
-      <p:bold r:id="rId15"/>
+      <p:regular r:id="rId15"/>
+      <p:bold r:id="rId16"/>
     </p:embeddedFont>
   </p:embeddedFontLst>
   <p:defaultTextStyle>
@@ -231,6 +232,11 @@
       </a:defRPr>
     </a:lvl9pPr>
   </p:defaultTextStyle>
+  <p:extLst>
+    <p:ext uri="{EFAFB233-063F-42B5-8137-9DF3F51BA10A}">
+      <p15:sldGuideLst xmlns:p15="http://schemas.microsoft.com/office/powerpoint/2012/main"/>
+    </p:ext>
+  </p:extLst>
 </p:presentation>
 </file>
 
@@ -396,7 +402,7 @@
     </p:spTree>
     <p:extLst>
       <p:ext uri="{BB962C8B-B14F-4D97-AF65-F5344CB8AC3E}">
-        <p14:creationId xmlns:p14="http://schemas.microsoft.com/office/powerpoint/2010/main" val="1330591327"/>
+        <p14:creationId xmlns:p14="http://schemas.microsoft.com/office/powerpoint/2010/main" val="1601908665"/>
       </p:ext>
     </p:extLst>
   </p:cSld>
@@ -525,8 +531,8 @@
         </p:nvSpPr>
         <p:spPr>
           <a:xfrm>
-            <a:off x="381300" y="685800"/>
-            <a:ext cx="6096075" cy="3429000"/>
+            <a:off x="381000" y="685800"/>
+            <a:ext cx="6096000" cy="3429000"/>
           </a:xfrm>
           <a:custGeom>
             <a:avLst/>
@@ -592,7 +598,7 @@
     </p:spTree>
     <p:extLst>
       <p:ext uri="{BB962C8B-B14F-4D97-AF65-F5344CB8AC3E}">
-        <p14:creationId xmlns:p14="http://schemas.microsoft.com/office/powerpoint/2010/main" val="1567306393"/>
+        <p14:creationId xmlns:p14="http://schemas.microsoft.com/office/powerpoint/2010/main" val="2025299442"/>
       </p:ext>
     </p:extLst>
   </p:cSld>
@@ -698,7 +704,7 @@
     </p:spTree>
     <p:extLst>
       <p:ext uri="{BB962C8B-B14F-4D97-AF65-F5344CB8AC3E}">
-        <p14:creationId xmlns:p14="http://schemas.microsoft.com/office/powerpoint/2010/main" val="3624447100"/>
+        <p14:creationId xmlns:p14="http://schemas.microsoft.com/office/powerpoint/2010/main" val="2475478513"/>
       </p:ext>
     </p:extLst>
   </p:cSld>
@@ -804,7 +810,113 @@
     </p:spTree>
     <p:extLst>
       <p:ext uri="{BB962C8B-B14F-4D97-AF65-F5344CB8AC3E}">
-        <p14:creationId xmlns:p14="http://schemas.microsoft.com/office/powerpoint/2010/main" val="1111741712"/>
+        <p14:creationId xmlns:p14="http://schemas.microsoft.com/office/powerpoint/2010/main" val="2689283215"/>
+      </p:ext>
+    </p:extLst>
+  </p:cSld>
+  <p:clrMapOvr>
+    <a:masterClrMapping/>
+  </p:clrMapOvr>
+</p:notes>
+</file>
+
+<file path=ppt/notesSlides/notesSlide12.xml><?xml version="1.0" encoding="utf-8"?>
+<p:notes xmlns:a="http://schemas.openxmlformats.org/drawingml/2006/main" xmlns:r="http://schemas.openxmlformats.org/officeDocument/2006/relationships" xmlns:p="http://schemas.openxmlformats.org/presentationml/2006/main" showMasterSp="0" showMasterPhAnim="0">
+  <p:cSld>
+    <p:spTree>
+      <p:nvGrpSpPr>
+        <p:cNvPr id="1" name="Shape 128"/>
+        <p:cNvGrpSpPr/>
+        <p:nvPr/>
+      </p:nvGrpSpPr>
+      <p:grpSpPr>
+        <a:xfrm>
+          <a:off x="0" y="0"/>
+          <a:ext cx="0" cy="0"/>
+          <a:chOff x="0" y="0"/>
+          <a:chExt cx="0" cy="0"/>
+        </a:xfrm>
+      </p:grpSpPr>
+      <p:sp>
+        <p:nvSpPr>
+          <p:cNvPr id="129" name="Shape 129"/>
+          <p:cNvSpPr>
+            <a:spLocks noGrp="1" noRot="1" noChangeAspect="1"/>
+          </p:cNvSpPr>
+          <p:nvPr>
+            <p:ph type="sldImg" idx="2"/>
+          </p:nvPr>
+        </p:nvSpPr>
+        <p:spPr>
+          <a:xfrm>
+            <a:off x="381000" y="685800"/>
+            <a:ext cx="6096000" cy="3429000"/>
+          </a:xfrm>
+          <a:custGeom>
+            <a:avLst/>
+            <a:gdLst/>
+            <a:ahLst/>
+            <a:cxnLst/>
+            <a:rect l="0" t="0" r="0" b="0"/>
+            <a:pathLst>
+              <a:path w="120000" h="120000" extrusionOk="0">
+                <a:moveTo>
+                  <a:pt x="0" y="0"/>
+                </a:moveTo>
+                <a:lnTo>
+                  <a:pt x="120000" y="0"/>
+                </a:lnTo>
+                <a:lnTo>
+                  <a:pt x="120000" y="120000"/>
+                </a:lnTo>
+                <a:lnTo>
+                  <a:pt x="0" y="120000"/>
+                </a:lnTo>
+                <a:close/>
+              </a:path>
+            </a:pathLst>
+          </a:custGeom>
+        </p:spPr>
+      </p:sp>
+      <p:sp>
+        <p:nvSpPr>
+          <p:cNvPr id="130" name="Shape 130"/>
+          <p:cNvSpPr txBox="1">
+            <a:spLocks noGrp="1"/>
+          </p:cNvSpPr>
+          <p:nvPr>
+            <p:ph type="body" idx="1"/>
+          </p:nvPr>
+        </p:nvSpPr>
+        <p:spPr>
+          <a:xfrm>
+            <a:off x="685800" y="4343400"/>
+            <a:ext cx="5486400" cy="4114800"/>
+          </a:xfrm>
+          <a:prstGeom prst="rect">
+            <a:avLst/>
+          </a:prstGeom>
+        </p:spPr>
+        <p:txBody>
+          <a:bodyPr lIns="91425" tIns="91425" rIns="91425" bIns="91425" anchor="t" anchorCtr="0">
+            <a:noAutofit/>
+          </a:bodyPr>
+          <a:lstStyle/>
+          <a:p>
+            <a:pPr lvl="0">
+              <a:spcBef>
+                <a:spcPts val="0"/>
+              </a:spcBef>
+              <a:buNone/>
+            </a:pPr>
+            <a:endParaRPr lang="en"/>
+          </a:p>
+        </p:txBody>
+      </p:sp>
+    </p:spTree>
+    <p:extLst>
+      <p:ext uri="{BB962C8B-B14F-4D97-AF65-F5344CB8AC3E}">
+        <p14:creationId xmlns:p14="http://schemas.microsoft.com/office/powerpoint/2010/main" val="937356023"/>
       </p:ext>
     </p:extLst>
   </p:cSld>
@@ -843,7 +955,7 @@
         </p:nvSpPr>
         <p:spPr>
           <a:xfrm>
-            <a:off x="381300" y="685800"/>
+            <a:off x="381000" y="685800"/>
             <a:ext cx="6096000" cy="3429000"/>
           </a:xfrm>
           <a:custGeom>
@@ -910,7 +1022,7 @@
     </p:spTree>
     <p:extLst>
       <p:ext uri="{BB962C8B-B14F-4D97-AF65-F5344CB8AC3E}">
-        <p14:creationId xmlns:p14="http://schemas.microsoft.com/office/powerpoint/2010/main" val="1782115149"/>
+        <p14:creationId xmlns:p14="http://schemas.microsoft.com/office/powerpoint/2010/main" val="2191991125"/>
       </p:ext>
     </p:extLst>
   </p:cSld>
@@ -949,7 +1061,7 @@
         </p:nvSpPr>
         <p:spPr>
           <a:xfrm>
-            <a:off x="381300" y="685800"/>
+            <a:off x="381000" y="685800"/>
             <a:ext cx="6096000" cy="3429000"/>
           </a:xfrm>
           <a:custGeom>
@@ -1016,7 +1128,7 @@
     </p:spTree>
     <p:extLst>
       <p:ext uri="{BB962C8B-B14F-4D97-AF65-F5344CB8AC3E}">
-        <p14:creationId xmlns:p14="http://schemas.microsoft.com/office/powerpoint/2010/main" val="2760053028"/>
+        <p14:creationId xmlns:p14="http://schemas.microsoft.com/office/powerpoint/2010/main" val="3324839791"/>
       </p:ext>
     </p:extLst>
   </p:cSld>
@@ -1055,7 +1167,7 @@
         </p:nvSpPr>
         <p:spPr>
           <a:xfrm>
-            <a:off x="381300" y="685800"/>
+            <a:off x="381000" y="685800"/>
             <a:ext cx="6096000" cy="3429000"/>
           </a:xfrm>
           <a:custGeom>
@@ -1122,7 +1234,7 @@
     </p:spTree>
     <p:extLst>
       <p:ext uri="{BB962C8B-B14F-4D97-AF65-F5344CB8AC3E}">
-        <p14:creationId xmlns:p14="http://schemas.microsoft.com/office/powerpoint/2010/main" val="3698682088"/>
+        <p14:creationId xmlns:p14="http://schemas.microsoft.com/office/powerpoint/2010/main" val="836413599"/>
       </p:ext>
     </p:extLst>
   </p:cSld>
@@ -1161,7 +1273,7 @@
         </p:nvSpPr>
         <p:spPr>
           <a:xfrm>
-            <a:off x="381300" y="685800"/>
+            <a:off x="381000" y="685800"/>
             <a:ext cx="6096000" cy="3429000"/>
           </a:xfrm>
           <a:custGeom>
@@ -1228,7 +1340,7 @@
     </p:spTree>
     <p:extLst>
       <p:ext uri="{BB962C8B-B14F-4D97-AF65-F5344CB8AC3E}">
-        <p14:creationId xmlns:p14="http://schemas.microsoft.com/office/powerpoint/2010/main" val="3389959828"/>
+        <p14:creationId xmlns:p14="http://schemas.microsoft.com/office/powerpoint/2010/main" val="604695497"/>
       </p:ext>
     </p:extLst>
   </p:cSld>
@@ -1267,7 +1379,7 @@
         </p:nvSpPr>
         <p:spPr>
           <a:xfrm>
-            <a:off x="381300" y="685800"/>
+            <a:off x="381000" y="685800"/>
             <a:ext cx="6096000" cy="3429000"/>
           </a:xfrm>
           <a:custGeom>
@@ -1321,20 +1433,20 @@
           </a:bodyPr>
           <a:lstStyle/>
           <a:p>
-            <a:pPr lvl="0">
+            <a:pPr lvl="0" rtl="0">
               <a:spcBef>
                 <a:spcPts val="0"/>
               </a:spcBef>
               <a:buNone/>
             </a:pPr>
-            <a:endParaRPr lang="en"/>
+            <a:endParaRPr/>
           </a:p>
         </p:txBody>
       </p:sp>
     </p:spTree>
     <p:extLst>
       <p:ext uri="{BB962C8B-B14F-4D97-AF65-F5344CB8AC3E}">
-        <p14:creationId xmlns:p14="http://schemas.microsoft.com/office/powerpoint/2010/main" val="2179985054"/>
+        <p14:creationId xmlns:p14="http://schemas.microsoft.com/office/powerpoint/2010/main" val="3522333386"/>
       </p:ext>
     </p:extLst>
   </p:cSld>
@@ -1373,7 +1485,7 @@
         </p:nvSpPr>
         <p:spPr>
           <a:xfrm>
-            <a:off x="381300" y="685800"/>
+            <a:off x="381000" y="685800"/>
             <a:ext cx="6096000" cy="3429000"/>
           </a:xfrm>
           <a:custGeom>
@@ -1440,7 +1552,7 @@
     </p:spTree>
     <p:extLst>
       <p:ext uri="{BB962C8B-B14F-4D97-AF65-F5344CB8AC3E}">
-        <p14:creationId xmlns:p14="http://schemas.microsoft.com/office/powerpoint/2010/main" val="300746137"/>
+        <p14:creationId xmlns:p14="http://schemas.microsoft.com/office/powerpoint/2010/main" val="1666726167"/>
       </p:ext>
     </p:extLst>
   </p:cSld>
@@ -1479,7 +1591,7 @@
         </p:nvSpPr>
         <p:spPr>
           <a:xfrm>
-            <a:off x="381300" y="685800"/>
+            <a:off x="381000" y="685800"/>
             <a:ext cx="6096000" cy="3429000"/>
           </a:xfrm>
           <a:custGeom>
@@ -1546,7 +1658,7 @@
     </p:spTree>
     <p:extLst>
       <p:ext uri="{BB962C8B-B14F-4D97-AF65-F5344CB8AC3E}">
-        <p14:creationId xmlns:p14="http://schemas.microsoft.com/office/powerpoint/2010/main" val="962816177"/>
+        <p14:creationId xmlns:p14="http://schemas.microsoft.com/office/powerpoint/2010/main" val="2893022721"/>
       </p:ext>
     </p:extLst>
   </p:cSld>
@@ -1585,7 +1697,7 @@
         </p:nvSpPr>
         <p:spPr>
           <a:xfrm>
-            <a:off x="381300" y="685800"/>
+            <a:off x="381000" y="685800"/>
             <a:ext cx="6096000" cy="3429000"/>
           </a:xfrm>
           <a:custGeom>
@@ -1652,7 +1764,7 @@
     </p:spTree>
     <p:extLst>
       <p:ext uri="{BB962C8B-B14F-4D97-AF65-F5344CB8AC3E}">
-        <p14:creationId xmlns:p14="http://schemas.microsoft.com/office/powerpoint/2010/main" val="2228672275"/>
+        <p14:creationId xmlns:p14="http://schemas.microsoft.com/office/powerpoint/2010/main" val="3355984843"/>
       </p:ext>
     </p:extLst>
   </p:cSld>
@@ -5252,7 +5364,7 @@
                 <a:cs typeface="Tahoma"/>
                 <a:sym typeface="Tahoma"/>
               </a:rPr>
-              <a:t>Better Speedups Using Simpler Parallel Programming for Graph Connectivity and Biconnectivity</a:t>
+              <a:t>A Simple and Practical Linear-Work Parallel Algorithm for Connectivity</a:t>
             </a:r>
           </a:p>
         </p:txBody>
@@ -5269,8 +5381,8 @@
         </p:nvSpPr>
         <p:spPr>
           <a:xfrm>
-            <a:off x="311700" y="1385797"/>
-            <a:ext cx="8520600" cy="3075600"/>
+            <a:off x="311700" y="1359300"/>
+            <a:ext cx="8520600" cy="3534600"/>
           </a:xfrm>
           <a:prstGeom prst="rect">
             <a:avLst/>
@@ -5287,7 +5399,7 @@
                 <a:spcPts val="0"/>
               </a:spcBef>
               <a:spcAft>
-                <a:spcPts val="0"/>
+                <a:spcPts val="1000"/>
               </a:spcAft>
               <a:buSzPct val="100000"/>
               <a:buFont typeface="Tahoma"/>
@@ -5300,7 +5412,7 @@
                 <a:cs typeface="Tahoma"/>
                 <a:sym typeface="Tahoma"/>
               </a:rPr>
-              <a:t>J. A. Edwards, U. Vishkin (2012)</a:t>
+              <a:t>J. Shun, L. Dhulipala, G. E. Blelloch (2014)</a:t>
             </a:r>
           </a:p>
           <a:p>
@@ -5309,7 +5421,7 @@
                 <a:spcPts val="0"/>
               </a:spcBef>
               <a:spcAft>
-                <a:spcPts val="0"/>
+                <a:spcPts val="1000"/>
               </a:spcAft>
               <a:buSzPct val="100000"/>
               <a:buFont typeface="Tahoma"/>
@@ -5322,7 +5434,7 @@
                 <a:cs typeface="Tahoma"/>
                 <a:sym typeface="Tahoma"/>
               </a:rPr>
-              <a:t>Авторы рассматривают проблему </a:t>
+              <a:t>Рекурсивный алгоритм сложности </a:t>
             </a:r>
             <a:r>
               <a:rPr lang="en" sz="2200" i="1">
@@ -5331,7 +5443,43 @@
                 <a:cs typeface="Tahoma"/>
                 <a:sym typeface="Tahoma"/>
               </a:rPr>
-              <a:t>двусвязности</a:t>
+              <a:t>O(m)</a:t>
+            </a:r>
+            <a:r>
+              <a:rPr lang="en" sz="2200">
+                <a:latin typeface="Tahoma"/>
+                <a:ea typeface="Tahoma"/>
+                <a:cs typeface="Tahoma"/>
+                <a:sym typeface="Tahoma"/>
+              </a:rPr>
+              <a:t> и глубины </a:t>
+            </a:r>
+            <a:r>
+              <a:rPr lang="en" sz="2200" i="1">
+                <a:latin typeface="Tahoma"/>
+                <a:ea typeface="Tahoma"/>
+                <a:cs typeface="Tahoma"/>
+                <a:sym typeface="Tahoma"/>
+              </a:rPr>
+              <a:t>O(log</a:t>
+            </a:r>
+            <a:r>
+              <a:rPr lang="en" sz="2200" i="1" baseline="30000">
+                <a:latin typeface="Tahoma"/>
+                <a:ea typeface="Tahoma"/>
+                <a:cs typeface="Tahoma"/>
+                <a:sym typeface="Tahoma"/>
+              </a:rPr>
+              <a:t>3</a:t>
+            </a:r>
+            <a:r>
+              <a:rPr lang="en" sz="2200" i="1">
+                <a:latin typeface="Tahoma"/>
+                <a:ea typeface="Tahoma"/>
+                <a:cs typeface="Tahoma"/>
+                <a:sym typeface="Tahoma"/>
+              </a:rPr>
+              <a:t> n)</a:t>
             </a:r>
           </a:p>
           <a:p>
@@ -5347,13 +5495,76 @@
               <a:buChar char="●"/>
             </a:pPr>
             <a:r>
+              <a:rPr lang="en" sz="2200" i="1">
+                <a:latin typeface="Tahoma"/>
+                <a:ea typeface="Tahoma"/>
+                <a:cs typeface="Tahoma"/>
+                <a:sym typeface="Tahoma"/>
+              </a:rPr>
+              <a:t>(β, d)</a:t>
+            </a:r>
+            <a:r>
               <a:rPr lang="en" sz="2200">
                 <a:latin typeface="Tahoma"/>
                 <a:ea typeface="Tahoma"/>
                 <a:cs typeface="Tahoma"/>
                 <a:sym typeface="Tahoma"/>
               </a:rPr>
-              <a:t>Алгоритмы:</a:t>
+              <a:t>-разложение графа V </a:t>
+            </a:r>
+            <a:r>
+              <a:rPr lang="en" sz="2200" i="1">
+                <a:latin typeface="Tahoma"/>
+                <a:ea typeface="Tahoma"/>
+                <a:cs typeface="Tahoma"/>
+                <a:sym typeface="Tahoma"/>
+              </a:rPr>
+              <a:t>(0 &lt; β &lt; 1)</a:t>
+            </a:r>
+            <a:r>
+              <a:rPr lang="en" sz="2200">
+                <a:latin typeface="Tahoma"/>
+                <a:ea typeface="Tahoma"/>
+                <a:cs typeface="Tahoma"/>
+                <a:sym typeface="Tahoma"/>
+              </a:rPr>
+              <a:t> – V</a:t>
+            </a:r>
+            <a:r>
+              <a:rPr lang="en" sz="2200" baseline="-25000">
+                <a:latin typeface="Tahoma"/>
+                <a:ea typeface="Tahoma"/>
+                <a:cs typeface="Tahoma"/>
+                <a:sym typeface="Tahoma"/>
+              </a:rPr>
+              <a:t>1</a:t>
+            </a:r>
+            <a:r>
+              <a:rPr lang="en" sz="2200">
+                <a:latin typeface="Tahoma"/>
+                <a:ea typeface="Tahoma"/>
+                <a:cs typeface="Tahoma"/>
+                <a:sym typeface="Tahoma"/>
+              </a:rPr>
+              <a:t>, …, V</a:t>
+            </a:r>
+            <a:r>
+              <a:rPr lang="en" sz="2200" baseline="-25000">
+                <a:latin typeface="Tahoma"/>
+                <a:ea typeface="Tahoma"/>
+                <a:cs typeface="Tahoma"/>
+                <a:sym typeface="Tahoma"/>
+              </a:rPr>
+              <a:t>k</a:t>
+            </a:r>
+            <a:r>
+              <a:rPr lang="en" sz="2200">
+                <a:latin typeface="Tahoma"/>
+                <a:ea typeface="Tahoma"/>
+                <a:cs typeface="Tahoma"/>
+                <a:sym typeface="Tahoma"/>
+              </a:rPr>
+              <a:t>:</a:t>
             </a:r>
           </a:p>
           <a:p>
@@ -5375,7 +5586,25 @@
                 <a:cs typeface="Tahoma"/>
                 <a:sym typeface="Tahoma"/>
               </a:rPr>
-              <a:t>parallel DFS (pDFS) – время </a:t>
+              <a:t>кратчайший путь между вершинами в V</a:t>
+            </a:r>
+            <a:r>
+              <a:rPr lang="en" sz="2200" baseline="-25000">
+                <a:latin typeface="Tahoma"/>
+                <a:ea typeface="Tahoma"/>
+                <a:cs typeface="Tahoma"/>
+                <a:sym typeface="Tahoma"/>
+              </a:rPr>
+              <a:t>i</a:t>
+            </a:r>
+            <a:r>
+              <a:rPr lang="en" sz="2200">
+                <a:latin typeface="Tahoma"/>
+                <a:ea typeface="Tahoma"/>
+                <a:cs typeface="Tahoma"/>
+                <a:sym typeface="Tahoma"/>
+              </a:rPr>
+              <a:t> не длиннее </a:t>
             </a:r>
             <a:r>
               <a:rPr lang="en" sz="2200" i="1">
@@ -5384,16 +5613,7 @@
                 <a:cs typeface="Tahoma"/>
                 <a:sym typeface="Tahoma"/>
               </a:rPr>
-              <a:t>O(n)</a:t>
-            </a:r>
-            <a:r>
-              <a:rPr lang="en" sz="2200">
-                <a:latin typeface="Tahoma"/>
-                <a:ea typeface="Tahoma"/>
-                <a:cs typeface="Tahoma"/>
-                <a:sym typeface="Tahoma"/>
-              </a:rPr>
-              <a:t>, ⌈m/n⌉ + 1 процессоров</a:t>
+              <a:t>d</a:t>
             </a:r>
           </a:p>
           <a:p>
@@ -5415,7 +5635,83 @@
                 <a:cs typeface="Tahoma"/>
                 <a:sym typeface="Tahoma"/>
               </a:rPr>
-              <a:t>алгоритм Тарьяна-Вишкина – время </a:t>
+              <a:t>в разных V</a:t>
+            </a:r>
+            <a:r>
+              <a:rPr lang="en" sz="2200" baseline="-25000">
+                <a:latin typeface="Tahoma"/>
+                <a:ea typeface="Tahoma"/>
+                <a:cs typeface="Tahoma"/>
+                <a:sym typeface="Tahoma"/>
+              </a:rPr>
+              <a:t>i</a:t>
+            </a:r>
+            <a:r>
+              <a:rPr lang="en" sz="2200">
+                <a:latin typeface="Tahoma"/>
+                <a:ea typeface="Tahoma"/>
+                <a:cs typeface="Tahoma"/>
+                <a:sym typeface="Tahoma"/>
+              </a:rPr>
+              <a:t>, V</a:t>
+            </a:r>
+            <a:r>
+              <a:rPr lang="en" sz="2200" baseline="-25000">
+                <a:latin typeface="Tahoma"/>
+                <a:ea typeface="Tahoma"/>
+                <a:cs typeface="Tahoma"/>
+                <a:sym typeface="Tahoma"/>
+              </a:rPr>
+              <a:t>j</a:t>
+            </a:r>
+            <a:r>
+              <a:rPr lang="en" sz="2200">
+                <a:latin typeface="Tahoma"/>
+                <a:ea typeface="Tahoma"/>
+                <a:cs typeface="Tahoma"/>
+                <a:sym typeface="Tahoma"/>
+              </a:rPr>
+              <a:t> лежат концы не более </a:t>
+            </a:r>
+            <a:r>
+              <a:rPr lang="en" sz="2400" i="1">
+                <a:latin typeface="Tahoma"/>
+                <a:ea typeface="Tahoma"/>
+                <a:cs typeface="Tahoma"/>
+                <a:sym typeface="Tahoma"/>
+              </a:rPr>
+              <a:t>βm</a:t>
+            </a:r>
+            <a:r>
+              <a:rPr lang="en" sz="2400">
+                <a:latin typeface="Tahoma"/>
+                <a:ea typeface="Tahoma"/>
+                <a:cs typeface="Tahoma"/>
+                <a:sym typeface="Tahoma"/>
+              </a:rPr>
+              <a:t> рёбер</a:t>
+            </a:r>
+          </a:p>
+          <a:p>
+            <a:pPr marL="457200" lvl="0" indent="-381000" rtl="0">
+              <a:spcBef>
+                <a:spcPts val="0"/>
+              </a:spcBef>
+              <a:spcAft>
+                <a:spcPts val="0"/>
+              </a:spcAft>
+              <a:buSzPct val="100000"/>
+              <a:buFont typeface="Tahoma"/>
+              <a:buChar char="●"/>
+            </a:pPr>
+            <a:r>
+              <a:rPr lang="en" sz="2400">
+                <a:latin typeface="Tahoma"/>
+                <a:ea typeface="Tahoma"/>
+                <a:cs typeface="Tahoma"/>
+                <a:sym typeface="Tahoma"/>
+              </a:rPr>
+              <a:t>Реализации </a:t>
             </a:r>
             <a:r>
               <a:rPr lang="en" sz="2200" i="1">
@@ -5424,7 +5720,7 @@
                 <a:cs typeface="Tahoma"/>
                 <a:sym typeface="Tahoma"/>
               </a:rPr>
-              <a:t>O(log n)</a:t>
+              <a:t>(β, d)</a:t>
             </a:r>
             <a:r>
               <a:rPr lang="en" sz="2200">
@@ -5433,25 +5729,7 @@
                 <a:cs typeface="Tahoma"/>
                 <a:sym typeface="Tahoma"/>
               </a:rPr>
-              <a:t>, </a:t>
-            </a:r>
-            <a:r>
-              <a:rPr lang="en" sz="2200" i="1">
-                <a:latin typeface="Tahoma"/>
-                <a:ea typeface="Tahoma"/>
-                <a:cs typeface="Tahoma"/>
-                <a:sym typeface="Tahoma"/>
-              </a:rPr>
-              <a:t>O(n + m)</a:t>
-            </a:r>
-            <a:r>
-              <a:rPr lang="en" sz="2200">
-                <a:latin typeface="Tahoma"/>
-                <a:ea typeface="Tahoma"/>
-                <a:cs typeface="Tahoma"/>
-                <a:sym typeface="Tahoma"/>
-              </a:rPr>
-              <a:t> процессоров</a:t>
+              <a:t>-разложения:</a:t>
             </a:r>
           </a:p>
           <a:p>
@@ -5473,82 +5751,29 @@
                 <a:cs typeface="Tahoma"/>
                 <a:sym typeface="Tahoma"/>
               </a:rPr>
-              <a:t>алгоритм Тарьяна-Вишкина с использованием BFS –</a:t>
-            </a:r>
-            <a:br>
+              <a:t>параллельный (покомпонентно) BFS</a:t>
+            </a:r>
+          </a:p>
+          <a:p>
+            <a:pPr marL="914400" lvl="1" indent="-368300" rtl="0">
+              <a:spcBef>
+                <a:spcPts val="0"/>
+              </a:spcBef>
+              <a:spcAft>
+                <a:spcPts val="0"/>
+              </a:spcAft>
+              <a:buSzPct val="100000"/>
+              <a:buFont typeface="Tahoma"/>
+              <a:buChar char="○"/>
+            </a:pPr>
+            <a:r>
               <a:rPr lang="en" sz="2200">
                 <a:latin typeface="Tahoma"/>
                 <a:ea typeface="Tahoma"/>
                 <a:cs typeface="Tahoma"/>
                 <a:sym typeface="Tahoma"/>
               </a:rPr>
-            </a:br>
-            <a:r>
-              <a:rPr lang="en" sz="2200">
-                <a:latin typeface="Tahoma"/>
-                <a:ea typeface="Tahoma"/>
-                <a:cs typeface="Tahoma"/>
-                <a:sym typeface="Tahoma"/>
-              </a:rPr>
-              <a:t>время </a:t>
-            </a:r>
-            <a:r>
-              <a:rPr lang="en" sz="2200" i="1">
-                <a:latin typeface="Tahoma"/>
-                <a:ea typeface="Tahoma"/>
-                <a:cs typeface="Tahoma"/>
-                <a:sym typeface="Tahoma"/>
-              </a:rPr>
-              <a:t>O(h log n)</a:t>
-            </a:r>
-            <a:r>
-              <a:rPr lang="en" sz="2200">
-                <a:latin typeface="Tahoma"/>
-                <a:ea typeface="Tahoma"/>
-                <a:cs typeface="Tahoma"/>
-                <a:sym typeface="Tahoma"/>
-              </a:rPr>
-              <a:t>, </a:t>
-            </a:r>
-            <a:r>
-              <a:rPr lang="en" sz="2200" i="1">
-                <a:latin typeface="Tahoma"/>
-                <a:ea typeface="Tahoma"/>
-                <a:cs typeface="Tahoma"/>
-                <a:sym typeface="Tahoma"/>
-              </a:rPr>
-              <a:t>O(n + m)</a:t>
-            </a:r>
-            <a:r>
-              <a:rPr lang="en" sz="2200">
-                <a:latin typeface="Tahoma"/>
-                <a:ea typeface="Tahoma"/>
-                <a:cs typeface="Tahoma"/>
-                <a:sym typeface="Tahoma"/>
-              </a:rPr>
-              <a:t> процессоров</a:t>
-            </a:r>
-          </a:p>
-          <a:p>
-            <a:pPr marL="457200" lvl="0" indent="-368300">
-              <a:spcBef>
-                <a:spcPts val="0"/>
-              </a:spcBef>
-              <a:spcAft>
-                <a:spcPts val="0"/>
-              </a:spcAft>
-              <a:buSzPct val="100000"/>
-              <a:buFont typeface="Tahoma"/>
-              <a:buChar char="●"/>
-            </a:pPr>
-            <a:r>
-              <a:rPr lang="en" sz="2200">
-                <a:latin typeface="Tahoma"/>
-                <a:ea typeface="Tahoma"/>
-                <a:cs typeface="Tahoma"/>
-                <a:sym typeface="Tahoma"/>
-              </a:rPr>
-              <a:t>Платформы: Explicit Multi-Threading (XMT), GPGPU</a:t>
+              <a:t>две оптимизации параллельного BFS</a:t>
             </a:r>
           </a:p>
         </p:txBody>
@@ -5565,8 +5790,8 @@
         </p:nvSpPr>
         <p:spPr>
           <a:xfrm>
-            <a:off x="8386618" y="4663216"/>
-            <a:ext cx="634539" cy="393600"/>
+            <a:off x="8387542" y="4663216"/>
+            <a:ext cx="633615" cy="393600"/>
           </a:xfrm>
           <a:prstGeom prst="rect">
             <a:avLst/>
@@ -5596,7 +5821,7 @@
             </a:fld>
             <a:r>
               <a:rPr lang="en"/>
-              <a:t>/11</a:t>
+              <a:t>/12</a:t>
             </a:r>
           </a:p>
         </p:txBody>
@@ -5606,13 +5831,6 @@
   <p:clrMapOvr>
     <a:masterClrMapping/>
   </p:clrMapOvr>
-  <p:timing>
-    <p:tnLst>
-      <p:par>
-        <p:cTn id="1" dur="indefinite" restart="never" nodeType="tmRoot"/>
-      </p:par>
-    </p:tnLst>
-  </p:timing>
 </p:sld>
 </file>
 
@@ -5671,7 +5889,7 @@
                 <a:cs typeface="Tahoma"/>
                 <a:sym typeface="Tahoma"/>
               </a:rPr>
-              <a:t>Итоги: выбранные статьи</a:t>
+              <a:t>Better Speedups Using Simpler Parallel Programming for Graph Connectivity and Biconnectivity</a:t>
             </a:r>
           </a:p>
         </p:txBody>
@@ -5688,8 +5906,8 @@
         </p:nvSpPr>
         <p:spPr>
           <a:xfrm>
-            <a:off x="311700" y="1152475"/>
-            <a:ext cx="8520600" cy="3416400"/>
+            <a:off x="311700" y="1302670"/>
+            <a:ext cx="8520600" cy="3075600"/>
           </a:xfrm>
           <a:prstGeom prst="rect">
             <a:avLst/>
@@ -5701,47 +5919,309 @@
           </a:bodyPr>
           <a:lstStyle/>
           <a:p>
-            <a:pPr marL="457200" lvl="0" indent="-381000" rtl="0">
+            <a:pPr marL="457200" lvl="0" indent="-368300" rtl="0">
               <a:spcBef>
                 <a:spcPts val="0"/>
               </a:spcBef>
               <a:spcAft>
-                <a:spcPts val="1000"/>
+                <a:spcPts val="0"/>
               </a:spcAft>
               <a:buSzPct val="100000"/>
               <a:buFont typeface="Tahoma"/>
               <a:buChar char="●"/>
             </a:pPr>
             <a:r>
-              <a:rPr lang="en" sz="2400">
-                <a:latin typeface="Tahoma"/>
-                <a:ea typeface="Tahoma"/>
-                <a:cs typeface="Tahoma"/>
-                <a:sym typeface="Tahoma"/>
-              </a:rPr>
-              <a:t>A Fast GPU Algorithm for Graph Connectivity</a:t>
-            </a:r>
-          </a:p>
-          <a:p>
-            <a:pPr marL="457200" lvl="0" indent="-381000" rtl="0">
+              <a:rPr lang="en" sz="2200">
+                <a:latin typeface="Tahoma"/>
+                <a:ea typeface="Tahoma"/>
+                <a:cs typeface="Tahoma"/>
+                <a:sym typeface="Tahoma"/>
+              </a:rPr>
+              <a:t>J. A. Edwards, U. Vishkin (2012)</a:t>
+            </a:r>
+          </a:p>
+          <a:p>
+            <a:pPr marL="457200" lvl="0" indent="-368300" rtl="0">
               <a:spcBef>
                 <a:spcPts val="0"/>
               </a:spcBef>
               <a:spcAft>
-                <a:spcPts val="1000"/>
+                <a:spcPts val="0"/>
               </a:spcAft>
               <a:buSzPct val="100000"/>
               <a:buFont typeface="Tahoma"/>
               <a:buChar char="●"/>
             </a:pPr>
             <a:r>
-              <a:rPr lang="en" sz="2400">
-                <a:latin typeface="Tahoma"/>
-                <a:ea typeface="Tahoma"/>
-                <a:cs typeface="Tahoma"/>
-                <a:sym typeface="Tahoma"/>
-              </a:rPr>
-              <a:t>A Simple and Practical Linear-Work Parallel Algorithm for Connectivity</a:t>
+              <a:rPr lang="en" sz="2200">
+                <a:latin typeface="Tahoma"/>
+                <a:ea typeface="Tahoma"/>
+                <a:cs typeface="Tahoma"/>
+                <a:sym typeface="Tahoma"/>
+              </a:rPr>
+              <a:t>Авторы рассматривают проблему </a:t>
+            </a:r>
+            <a:r>
+              <a:rPr lang="en" sz="2200" i="1">
+                <a:latin typeface="Tahoma"/>
+                <a:ea typeface="Tahoma"/>
+                <a:cs typeface="Tahoma"/>
+                <a:sym typeface="Tahoma"/>
+              </a:rPr>
+              <a:t>двусвязности</a:t>
+            </a:r>
+          </a:p>
+          <a:p>
+            <a:pPr marL="457200" lvl="0" indent="-368300" rtl="0">
+              <a:spcBef>
+                <a:spcPts val="0"/>
+              </a:spcBef>
+              <a:spcAft>
+                <a:spcPts val="0"/>
+              </a:spcAft>
+              <a:buSzPct val="100000"/>
+              <a:buFont typeface="Tahoma"/>
+              <a:buChar char="●"/>
+            </a:pPr>
+            <a:r>
+              <a:rPr lang="en" sz="2200">
+                <a:latin typeface="Tahoma"/>
+                <a:ea typeface="Tahoma"/>
+                <a:cs typeface="Tahoma"/>
+                <a:sym typeface="Tahoma"/>
+              </a:rPr>
+              <a:t>Алгоритмы:</a:t>
+            </a:r>
+          </a:p>
+          <a:p>
+            <a:pPr marL="914400" lvl="1" indent="-368300" rtl="0">
+              <a:spcBef>
+                <a:spcPts val="0"/>
+              </a:spcBef>
+              <a:spcAft>
+                <a:spcPts val="0"/>
+              </a:spcAft>
+              <a:buSzPct val="100000"/>
+              <a:buFont typeface="Tahoma"/>
+              <a:buChar char="○"/>
+            </a:pPr>
+            <a:r>
+              <a:rPr lang="ru-RU" sz="2000" smtClean="0">
+                <a:latin typeface="Tahoma"/>
+                <a:ea typeface="Tahoma"/>
+                <a:cs typeface="Tahoma"/>
+                <a:sym typeface="Tahoma"/>
+              </a:rPr>
+              <a:t>Хопкрофта-Тарьяна </a:t>
+            </a:r>
+            <a:r>
+              <a:rPr lang="en" sz="2000" smtClean="0">
+                <a:latin typeface="Tahoma"/>
+                <a:ea typeface="Tahoma"/>
+                <a:cs typeface="Tahoma"/>
+                <a:sym typeface="Tahoma"/>
+              </a:rPr>
+              <a:t>(pDFS</a:t>
+            </a:r>
+            <a:r>
+              <a:rPr lang="en" sz="2000">
+                <a:latin typeface="Tahoma"/>
+                <a:ea typeface="Tahoma"/>
+                <a:cs typeface="Tahoma"/>
+                <a:sym typeface="Tahoma"/>
+              </a:rPr>
+              <a:t>) – время </a:t>
+            </a:r>
+            <a:r>
+              <a:rPr lang="en" sz="2000" i="1">
+                <a:latin typeface="Tahoma"/>
+                <a:ea typeface="Tahoma"/>
+                <a:cs typeface="Tahoma"/>
+                <a:sym typeface="Tahoma"/>
+              </a:rPr>
+              <a:t>O(n)</a:t>
+            </a:r>
+            <a:r>
+              <a:rPr lang="en" sz="2000">
+                <a:latin typeface="Tahoma"/>
+                <a:ea typeface="Tahoma"/>
+                <a:cs typeface="Tahoma"/>
+                <a:sym typeface="Tahoma"/>
+              </a:rPr>
+              <a:t>, ⌈m/n⌉ + 1 процессоров</a:t>
+            </a:r>
+          </a:p>
+          <a:p>
+            <a:pPr marL="914400" lvl="1" indent="-368300" rtl="0">
+              <a:spcBef>
+                <a:spcPts val="0"/>
+              </a:spcBef>
+              <a:spcAft>
+                <a:spcPts val="0"/>
+              </a:spcAft>
+              <a:buSzPct val="100000"/>
+              <a:buFont typeface="Tahoma"/>
+              <a:buChar char="○"/>
+            </a:pPr>
+            <a:r>
+              <a:rPr lang="en" sz="2000" smtClean="0">
+                <a:latin typeface="Tahoma"/>
+                <a:ea typeface="Tahoma"/>
+                <a:cs typeface="Tahoma"/>
+                <a:sym typeface="Tahoma"/>
+              </a:rPr>
+              <a:t>Тарьяна-Вишкина </a:t>
+            </a:r>
+            <a:r>
+              <a:rPr lang="en" sz="2000">
+                <a:latin typeface="Tahoma"/>
+                <a:ea typeface="Tahoma"/>
+                <a:cs typeface="Tahoma"/>
+                <a:sym typeface="Tahoma"/>
+              </a:rPr>
+              <a:t>– время </a:t>
+            </a:r>
+            <a:r>
+              <a:rPr lang="en" sz="2000" i="1">
+                <a:latin typeface="Tahoma"/>
+                <a:ea typeface="Tahoma"/>
+                <a:cs typeface="Tahoma"/>
+                <a:sym typeface="Tahoma"/>
+              </a:rPr>
+              <a:t>O(log n)</a:t>
+            </a:r>
+            <a:r>
+              <a:rPr lang="en" sz="2000">
+                <a:latin typeface="Tahoma"/>
+                <a:ea typeface="Tahoma"/>
+                <a:cs typeface="Tahoma"/>
+                <a:sym typeface="Tahoma"/>
+              </a:rPr>
+              <a:t>, </a:t>
+            </a:r>
+            <a:r>
+              <a:rPr lang="en" sz="2000" i="1">
+                <a:latin typeface="Tahoma"/>
+                <a:ea typeface="Tahoma"/>
+                <a:cs typeface="Tahoma"/>
+                <a:sym typeface="Tahoma"/>
+              </a:rPr>
+              <a:t>O(n + m)</a:t>
+            </a:r>
+            <a:r>
+              <a:rPr lang="en" sz="2000">
+                <a:latin typeface="Tahoma"/>
+                <a:ea typeface="Tahoma"/>
+                <a:cs typeface="Tahoma"/>
+                <a:sym typeface="Tahoma"/>
+              </a:rPr>
+              <a:t> процессоров</a:t>
+            </a:r>
+          </a:p>
+          <a:p>
+            <a:pPr marL="914400" lvl="1" indent="-368300" rtl="0">
+              <a:spcBef>
+                <a:spcPts val="0"/>
+              </a:spcBef>
+              <a:spcAft>
+                <a:spcPts val="0"/>
+              </a:spcAft>
+              <a:buSzPct val="100000"/>
+              <a:buFont typeface="Tahoma"/>
+              <a:buChar char="○"/>
+            </a:pPr>
+            <a:r>
+              <a:rPr lang="en" sz="2000" smtClean="0">
+                <a:latin typeface="Tahoma"/>
+                <a:ea typeface="Tahoma"/>
+                <a:cs typeface="Tahoma"/>
+                <a:sym typeface="Tahoma"/>
+              </a:rPr>
+              <a:t>Тарьяна-Вишкина </a:t>
+            </a:r>
+            <a:r>
+              <a:rPr lang="en" sz="2000">
+                <a:latin typeface="Tahoma"/>
+                <a:ea typeface="Tahoma"/>
+                <a:cs typeface="Tahoma"/>
+                <a:sym typeface="Tahoma"/>
+              </a:rPr>
+              <a:t>с использованием BFS –</a:t>
+            </a:r>
+            <a:br>
+              <a:rPr lang="en" sz="2000">
+                <a:latin typeface="Tahoma"/>
+                <a:ea typeface="Tahoma"/>
+                <a:cs typeface="Tahoma"/>
+                <a:sym typeface="Tahoma"/>
+              </a:rPr>
+            </a:br>
+            <a:r>
+              <a:rPr lang="en" sz="2000">
+                <a:latin typeface="Tahoma"/>
+                <a:ea typeface="Tahoma"/>
+                <a:cs typeface="Tahoma"/>
+                <a:sym typeface="Tahoma"/>
+              </a:rPr>
+              <a:t>время </a:t>
+            </a:r>
+            <a:r>
+              <a:rPr lang="en" sz="2000" i="1">
+                <a:latin typeface="Tahoma"/>
+                <a:ea typeface="Tahoma"/>
+                <a:cs typeface="Tahoma"/>
+                <a:sym typeface="Tahoma"/>
+              </a:rPr>
+              <a:t>O(h log n)</a:t>
+            </a:r>
+            <a:r>
+              <a:rPr lang="en" sz="2000">
+                <a:latin typeface="Tahoma"/>
+                <a:ea typeface="Tahoma"/>
+                <a:cs typeface="Tahoma"/>
+                <a:sym typeface="Tahoma"/>
+              </a:rPr>
+              <a:t>, </a:t>
+            </a:r>
+            <a:r>
+              <a:rPr lang="en" sz="2000" i="1">
+                <a:latin typeface="Tahoma"/>
+                <a:ea typeface="Tahoma"/>
+                <a:cs typeface="Tahoma"/>
+                <a:sym typeface="Tahoma"/>
+              </a:rPr>
+              <a:t>O(n + m)</a:t>
+            </a:r>
+            <a:r>
+              <a:rPr lang="en" sz="2000">
+                <a:latin typeface="Tahoma"/>
+                <a:ea typeface="Tahoma"/>
+                <a:cs typeface="Tahoma"/>
+                <a:sym typeface="Tahoma"/>
+              </a:rPr>
+              <a:t> процессоров</a:t>
+            </a:r>
+          </a:p>
+          <a:p>
+            <a:pPr marL="457200" lvl="0" indent="-368300">
+              <a:spcBef>
+                <a:spcPts val="0"/>
+              </a:spcBef>
+              <a:spcAft>
+                <a:spcPts val="0"/>
+              </a:spcAft>
+              <a:buSzPct val="100000"/>
+              <a:buFont typeface="Tahoma"/>
+              <a:buChar char="●"/>
+            </a:pPr>
+            <a:r>
+              <a:rPr lang="en" sz="2200">
+                <a:latin typeface="Tahoma"/>
+                <a:ea typeface="Tahoma"/>
+                <a:cs typeface="Tahoma"/>
+                <a:sym typeface="Tahoma"/>
+              </a:rPr>
+              <a:t>Платформы: Explicit Multi-Threading (XMT), GPGPU</a:t>
             </a:r>
           </a:p>
         </p:txBody>
@@ -5758,8 +6238,8 @@
         </p:nvSpPr>
         <p:spPr>
           <a:xfrm>
-            <a:off x="8358909" y="4663216"/>
-            <a:ext cx="662248" cy="393600"/>
+            <a:off x="8362604" y="4663216"/>
+            <a:ext cx="658553" cy="393600"/>
           </a:xfrm>
           <a:prstGeom prst="rect">
             <a:avLst/>
@@ -5789,7 +6269,7 @@
             </a:fld>
             <a:r>
               <a:rPr lang="en"/>
-              <a:t>/11</a:t>
+              <a:t>/12</a:t>
             </a:r>
           </a:p>
         </p:txBody>
@@ -5806,6 +6286,192 @@
       </p:par>
     </p:tnLst>
   </p:timing>
+</p:sld>
+</file>
+
+<file path=ppt/slides/slide12.xml><?xml version="1.0" encoding="utf-8"?>
+<p:sld xmlns:a="http://schemas.openxmlformats.org/drawingml/2006/main" xmlns:r="http://schemas.openxmlformats.org/officeDocument/2006/relationships" xmlns:p="http://schemas.openxmlformats.org/presentationml/2006/main">
+  <p:cSld>
+    <p:spTree>
+      <p:nvGrpSpPr>
+        <p:cNvPr id="1" name="Shape 131"/>
+        <p:cNvGrpSpPr/>
+        <p:nvPr/>
+      </p:nvGrpSpPr>
+      <p:grpSpPr>
+        <a:xfrm>
+          <a:off x="0" y="0"/>
+          <a:ext cx="0" cy="0"/>
+          <a:chOff x="0" y="0"/>
+          <a:chExt cx="0" cy="0"/>
+        </a:xfrm>
+      </p:grpSpPr>
+      <p:sp>
+        <p:nvSpPr>
+          <p:cNvPr id="132" name="Shape 132"/>
+          <p:cNvSpPr txBox="1">
+            <a:spLocks noGrp="1"/>
+          </p:cNvSpPr>
+          <p:nvPr>
+            <p:ph type="title"/>
+          </p:nvPr>
+        </p:nvSpPr>
+        <p:spPr>
+          <a:xfrm>
+            <a:off x="311700" y="445025"/>
+            <a:ext cx="8520600" cy="572700"/>
+          </a:xfrm>
+          <a:prstGeom prst="rect">
+            <a:avLst/>
+          </a:prstGeom>
+        </p:spPr>
+        <p:txBody>
+          <a:bodyPr lIns="91425" tIns="91425" rIns="91425" bIns="91425" anchor="t" anchorCtr="0">
+            <a:noAutofit/>
+          </a:bodyPr>
+          <a:lstStyle/>
+          <a:p>
+            <a:pPr lvl="0">
+              <a:spcBef>
+                <a:spcPts val="0"/>
+              </a:spcBef>
+              <a:buNone/>
+            </a:pPr>
+            <a:r>
+              <a:rPr lang="en">
+                <a:latin typeface="Tahoma"/>
+                <a:ea typeface="Tahoma"/>
+                <a:cs typeface="Tahoma"/>
+                <a:sym typeface="Tahoma"/>
+              </a:rPr>
+              <a:t>Итоги: выбранные статьи</a:t>
+            </a:r>
+          </a:p>
+        </p:txBody>
+      </p:sp>
+      <p:sp>
+        <p:nvSpPr>
+          <p:cNvPr id="133" name="Shape 133"/>
+          <p:cNvSpPr txBox="1">
+            <a:spLocks noGrp="1"/>
+          </p:cNvSpPr>
+          <p:nvPr>
+            <p:ph type="body" idx="1"/>
+          </p:nvPr>
+        </p:nvSpPr>
+        <p:spPr>
+          <a:xfrm>
+            <a:off x="311700" y="1152475"/>
+            <a:ext cx="8520600" cy="3416400"/>
+          </a:xfrm>
+          <a:prstGeom prst="rect">
+            <a:avLst/>
+          </a:prstGeom>
+        </p:spPr>
+        <p:txBody>
+          <a:bodyPr lIns="91425" tIns="91425" rIns="91425" bIns="91425" anchor="t" anchorCtr="0">
+            <a:noAutofit/>
+          </a:bodyPr>
+          <a:lstStyle/>
+          <a:p>
+            <a:pPr marL="457200" lvl="0" indent="-381000" rtl="0">
+              <a:spcBef>
+                <a:spcPts val="0"/>
+              </a:spcBef>
+              <a:spcAft>
+                <a:spcPts val="1000"/>
+              </a:spcAft>
+              <a:buSzPct val="100000"/>
+              <a:buFont typeface="Tahoma"/>
+              <a:buChar char="●"/>
+            </a:pPr>
+            <a:r>
+              <a:rPr lang="en" sz="2400">
+                <a:latin typeface="Tahoma"/>
+                <a:ea typeface="Tahoma"/>
+                <a:cs typeface="Tahoma"/>
+                <a:sym typeface="Tahoma"/>
+              </a:rPr>
+              <a:t>A Fast GPU Algorithm for Graph Connectivity</a:t>
+            </a:r>
+          </a:p>
+          <a:p>
+            <a:pPr marL="457200" lvl="0" indent="-381000" rtl="0">
+              <a:spcBef>
+                <a:spcPts val="0"/>
+              </a:spcBef>
+              <a:spcAft>
+                <a:spcPts val="1000"/>
+              </a:spcAft>
+              <a:buSzPct val="100000"/>
+              <a:buFont typeface="Tahoma"/>
+              <a:buChar char="●"/>
+            </a:pPr>
+            <a:r>
+              <a:rPr lang="en" sz="2400">
+                <a:latin typeface="Tahoma"/>
+                <a:ea typeface="Tahoma"/>
+                <a:cs typeface="Tahoma"/>
+                <a:sym typeface="Tahoma"/>
+              </a:rPr>
+              <a:t>A Simple and Practical Linear-Work Parallel Algorithm for Connectivity</a:t>
+            </a:r>
+          </a:p>
+        </p:txBody>
+      </p:sp>
+      <p:sp>
+        <p:nvSpPr>
+          <p:cNvPr id="134" name="Shape 134"/>
+          <p:cNvSpPr txBox="1">
+            <a:spLocks noGrp="1"/>
+          </p:cNvSpPr>
+          <p:nvPr>
+            <p:ph type="sldNum" idx="12"/>
+          </p:nvPr>
+        </p:nvSpPr>
+        <p:spPr>
+          <a:xfrm>
+            <a:off x="8379229" y="4663216"/>
+            <a:ext cx="641928" cy="393600"/>
+          </a:xfrm>
+          <a:prstGeom prst="rect">
+            <a:avLst/>
+          </a:prstGeom>
+        </p:spPr>
+        <p:txBody>
+          <a:bodyPr lIns="91425" tIns="91425" rIns="91425" bIns="91425" anchor="ctr" anchorCtr="0">
+            <a:noAutofit/>
+          </a:bodyPr>
+          <a:lstStyle/>
+          <a:p>
+            <a:pPr lvl="0" algn="r">
+              <a:spcBef>
+                <a:spcPts val="0"/>
+              </a:spcBef>
+              <a:buNone/>
+            </a:pPr>
+            <a:fld id="{00000000-1234-1234-1234-123412341234}" type="slidenum">
+              <a:rPr lang="en"/>
+              <a:pPr lvl="0" algn="r">
+                <a:spcBef>
+                  <a:spcPts val="0"/>
+                </a:spcBef>
+                <a:buNone/>
+              </a:pPr>
+              <a:t>12</a:t>
+            </a:fld>
+            <a:r>
+              <a:rPr lang="en"/>
+              <a:t>/12</a:t>
+            </a:r>
+          </a:p>
+        </p:txBody>
+      </p:sp>
+    </p:spTree>
+  </p:cSld>
+  <p:clrMapOvr>
+    <a:masterClrMapping/>
+  </p:clrMapOvr>
 </p:sld>
 </file>
 
@@ -5993,7 +6659,7 @@
             </a:fld>
             <a:r>
               <a:rPr lang="en"/>
-              <a:t>/11</a:t>
+              <a:t>/12</a:t>
             </a:r>
           </a:p>
         </p:txBody>
@@ -6003,13 +6669,6 @@
   <p:clrMapOvr>
     <a:masterClrMapping/>
   </p:clrMapOvr>
-  <p:timing>
-    <p:tnLst>
-      <p:par>
-        <p:cTn id="1" dur="indefinite" restart="never" nodeType="tmRoot"/>
-      </p:par>
-    </p:tnLst>
-  </p:timing>
 </p:sld>
 </file>
 
@@ -6184,7 +6843,7 @@
             </a:fld>
             <a:r>
               <a:rPr lang="en"/>
-              <a:t>/11</a:t>
+              <a:t>/12</a:t>
             </a:r>
           </a:p>
         </p:txBody>
@@ -6194,13 +6853,6 @@
   <p:clrMapOvr>
     <a:masterClrMapping/>
   </p:clrMapOvr>
-  <p:timing>
-    <p:tnLst>
-      <p:par>
-        <p:cTn id="1" dur="indefinite" restart="never" nodeType="tmRoot"/>
-      </p:par>
-    </p:tnLst>
-  </p:timing>
 </p:sld>
 </file>
 
@@ -6434,95 +7086,6 @@
               <a:t>D(v)</a:t>
             </a:r>
           </a:p>
-          <a:p>
-            <a:pPr marL="457200" lvl="0" indent="-368300" rtl="0">
-              <a:spcBef>
-                <a:spcPts val="0"/>
-              </a:spcBef>
-              <a:spcAft>
-                <a:spcPts val="1000"/>
-              </a:spcAft>
-              <a:buSzPct val="100000"/>
-              <a:buFont typeface="Tahoma"/>
-              <a:buChar char="●"/>
-            </a:pPr>
-            <a:r>
-              <a:rPr lang="en" sz="2200">
-                <a:latin typeface="Tahoma"/>
-                <a:ea typeface="Tahoma"/>
-                <a:cs typeface="Tahoma"/>
-                <a:sym typeface="Tahoma"/>
-              </a:rPr>
-              <a:t>“Short-cut”: </a:t>
-            </a:r>
-            <a:r>
-              <a:rPr lang="en" sz="2200" i="1">
-                <a:latin typeface="Tahoma"/>
-                <a:ea typeface="Tahoma"/>
-                <a:cs typeface="Tahoma"/>
-                <a:sym typeface="Tahoma"/>
-              </a:rPr>
-              <a:t>D(v) ← D(D(v))</a:t>
-            </a:r>
-          </a:p>
-          <a:p>
-            <a:pPr marL="457200" lvl="0" indent="-368300" rtl="0">
-              <a:spcBef>
-                <a:spcPts val="0"/>
-              </a:spcBef>
-              <a:spcAft>
-                <a:spcPts val="1000"/>
-              </a:spcAft>
-              <a:buSzPct val="100000"/>
-              <a:buFont typeface="Tahoma"/>
-              <a:buChar char="●"/>
-            </a:pPr>
-            <a:r>
-              <a:rPr lang="en" sz="2200">
-                <a:latin typeface="Tahoma"/>
-                <a:ea typeface="Tahoma"/>
-                <a:cs typeface="Tahoma"/>
-                <a:sym typeface="Tahoma"/>
-              </a:rPr>
-              <a:t>“Hooking”: </a:t>
-            </a:r>
-            <a:r>
-              <a:rPr lang="en" sz="2200" i="1">
-                <a:latin typeface="Tahoma"/>
-                <a:ea typeface="Tahoma"/>
-                <a:cs typeface="Tahoma"/>
-                <a:sym typeface="Tahoma"/>
-              </a:rPr>
-              <a:t>D(r</a:t>
-            </a:r>
-            <a:r>
-              <a:rPr lang="en" sz="2200" i="1" baseline="-25000">
-                <a:latin typeface="Tahoma"/>
-                <a:ea typeface="Tahoma"/>
-                <a:cs typeface="Tahoma"/>
-                <a:sym typeface="Tahoma"/>
-              </a:rPr>
-              <a:t>1</a:t>
-            </a:r>
-            <a:r>
-              <a:rPr lang="en" sz="2200" i="1">
-                <a:latin typeface="Tahoma"/>
-                <a:ea typeface="Tahoma"/>
-                <a:cs typeface="Tahoma"/>
-                <a:sym typeface="Tahoma"/>
-              </a:rPr>
-              <a:t>) ← v</a:t>
-            </a:r>
-            <a:r>
-              <a:rPr lang="en" sz="2200" i="1" baseline="-25000">
-                <a:latin typeface="Tahoma"/>
-                <a:ea typeface="Tahoma"/>
-                <a:cs typeface="Tahoma"/>
-                <a:sym typeface="Tahoma"/>
-              </a:rPr>
-              <a:t>2</a:t>
-            </a:r>
-          </a:p>
         </p:txBody>
       </p:sp>
       <p:sp>
@@ -6562,7 +7125,7 @@
             </a:fld>
             <a:r>
               <a:rPr lang="en"/>
-              <a:t>/11</a:t>
+              <a:t>/12</a:t>
             </a:r>
           </a:p>
         </p:txBody>
@@ -6572,13 +7135,6 @@
   <p:clrMapOvr>
     <a:masterClrMapping/>
   </p:clrMapOvr>
-  <p:timing>
-    <p:tnLst>
-      <p:par>
-        <p:cTn id="1" dur="indefinite" restart="never" nodeType="tmRoot"/>
-      </p:par>
-    </p:tnLst>
-  </p:timing>
 </p:sld>
 </file>
 
@@ -6637,7 +7193,7 @@
                 <a:cs typeface="Tahoma"/>
                 <a:sym typeface="Tahoma"/>
               </a:rPr>
-              <a:t>Алгоритм Шилоха-Вишкина</a:t>
+              <a:t>Дополнительные определения</a:t>
             </a:r>
           </a:p>
         </p:txBody>
@@ -6676,7 +7232,7 @@
               </a:spcAft>
               <a:buSzPct val="100000"/>
               <a:buFont typeface="Tahoma"/>
-              <a:buAutoNum type="arabicPeriod"/>
+              <a:buChar char="●"/>
             </a:pPr>
             <a:r>
               <a:rPr lang="en" sz="2200">
@@ -6685,24 +7241,25 @@
                 <a:cs typeface="Tahoma"/>
                 <a:sym typeface="Tahoma"/>
               </a:rPr>
-              <a:t>Short-cut:</a:t>
-            </a:r>
-            <a:br>
+              <a:t>Звезда – дерево с одним внутренним узлом (корнем) и </a:t>
+            </a:r>
+            <a:r>
+              <a:rPr lang="en" sz="2200" i="1">
+                <a:latin typeface="Tahoma"/>
+                <a:ea typeface="Tahoma"/>
+                <a:cs typeface="Tahoma"/>
+                <a:sym typeface="Tahoma"/>
+              </a:rPr>
+              <a:t>k</a:t>
+            </a:r>
+            <a:r>
               <a:rPr lang="en" sz="2200">
                 <a:latin typeface="Tahoma"/>
                 <a:ea typeface="Tahoma"/>
                 <a:cs typeface="Tahoma"/>
                 <a:sym typeface="Tahoma"/>
               </a:rPr>
-            </a:br>
-            <a:r>
-              <a:rPr lang="en" sz="2200" i="1">
-                <a:latin typeface="Tahoma"/>
-                <a:ea typeface="Tahoma"/>
-                <a:cs typeface="Tahoma"/>
-                <a:sym typeface="Tahoma"/>
-              </a:rPr>
-              <a:t>D(v) ← D(D(v))</a:t>
+              <a:t> листьями</a:t>
             </a:r>
           </a:p>
           <a:p>
@@ -6715,7 +7272,7 @@
               </a:spcAft>
               <a:buSzPct val="100000"/>
               <a:buFont typeface="Tahoma"/>
-              <a:buAutoNum type="arabicPeriod"/>
+              <a:buChar char="●"/>
             </a:pPr>
             <a:r>
               <a:rPr lang="en" sz="2200">
@@ -6724,16 +7281,52 @@
                 <a:cs typeface="Tahoma"/>
                 <a:sym typeface="Tahoma"/>
               </a:rPr>
-              <a:t>Hooking:</a:t>
-            </a:r>
-            <a:br>
+              <a:t>Операции на графе указателей:</a:t>
+            </a:r>
+          </a:p>
+          <a:p>
+            <a:pPr marL="914400" lvl="1" indent="-368300" rtl="0">
+              <a:spcBef>
+                <a:spcPts val="0"/>
+              </a:spcBef>
+              <a:spcAft>
+                <a:spcPts val="1000"/>
+              </a:spcAft>
+              <a:buSzPct val="100000"/>
+              <a:buFont typeface="Tahoma"/>
+              <a:buChar char="○"/>
+            </a:pPr>
+            <a:r>
               <a:rPr lang="en" sz="2200">
                 <a:latin typeface="Tahoma"/>
                 <a:ea typeface="Tahoma"/>
                 <a:cs typeface="Tahoma"/>
                 <a:sym typeface="Tahoma"/>
               </a:rPr>
-            </a:br>
+              <a:t>“Short-cut”: </a:t>
+            </a:r>
+            <a:r>
+              <a:rPr lang="en" sz="2200" i="1">
+                <a:latin typeface="Tahoma"/>
+                <a:ea typeface="Tahoma"/>
+                <a:cs typeface="Tahoma"/>
+                <a:sym typeface="Tahoma"/>
+              </a:rPr>
+              <a:t>D(v) ← D(D(v))</a:t>
+            </a:r>
+          </a:p>
+          <a:p>
+            <a:pPr marL="914400" lvl="1" indent="-368300" rtl="0">
+              <a:spcBef>
+                <a:spcPts val="0"/>
+              </a:spcBef>
+              <a:spcAft>
+                <a:spcPts val="1000"/>
+              </a:spcAft>
+              <a:buSzPct val="100000"/>
+              <a:buFont typeface="Tahoma"/>
+              <a:buChar char="○"/>
+            </a:pPr>
             <a:r>
               <a:rPr lang="en" sz="2200">
                 <a:latin typeface="Tahoma"/>
@@ -6741,7 +7334,7 @@
                 <a:cs typeface="Tahoma"/>
                 <a:sym typeface="Tahoma"/>
               </a:rPr>
-              <a:t>у каждого ребра </a:t>
+              <a:t>“Hooking”: </a:t>
             </a:r>
             <a:r>
               <a:rPr lang="en" sz="2200" i="1">
@@ -6750,7 +7343,34 @@
                 <a:cs typeface="Tahoma"/>
                 <a:sym typeface="Tahoma"/>
               </a:rPr>
-              <a:t>uv (u ≠ v)</a:t>
+              <a:t>D(r</a:t>
+            </a:r>
+            <a:r>
+              <a:rPr lang="en" sz="2200" i="1" baseline="-25000">
+                <a:latin typeface="Tahoma"/>
+                <a:ea typeface="Tahoma"/>
+                <a:cs typeface="Tahoma"/>
+                <a:sym typeface="Tahoma"/>
+              </a:rPr>
+              <a:t>1</a:t>
+            </a:r>
+            <a:r>
+              <a:rPr lang="en" sz="2200" i="1">
+                <a:latin typeface="Tahoma"/>
+                <a:ea typeface="Tahoma"/>
+                <a:cs typeface="Tahoma"/>
+                <a:sym typeface="Tahoma"/>
+              </a:rPr>
+              <a:t>) ← v</a:t>
+            </a:r>
+            <a:r>
+              <a:rPr lang="en" sz="2200" i="1" baseline="-25000">
+                <a:latin typeface="Tahoma"/>
+                <a:ea typeface="Tahoma"/>
+                <a:cs typeface="Tahoma"/>
+                <a:sym typeface="Tahoma"/>
+              </a:rPr>
+              <a:t>2</a:t>
             </a:r>
             <a:r>
               <a:rPr lang="en" sz="2200">
@@ -6759,18 +7379,39 @@
                 <a:cs typeface="Tahoma"/>
                 <a:sym typeface="Tahoma"/>
               </a:rPr>
-              <a:t> одна из инцидентных вершин меняет родителя</a:t>
-            </a:r>
-          </a:p>
-          <a:p>
-            <a:pPr marL="457200" lvl="0" indent="-368300">
-              <a:spcBef>
-                <a:spcPts val="0"/>
-              </a:spcBef>
+              <a:t>, где</a:t>
+            </a:r>
+          </a:p>
+          <a:p>
+            <a:pPr marL="1371600" lvl="2" indent="-368300" rtl="0">
+              <a:spcBef>
+                <a:spcPts val="0"/>
+              </a:spcBef>
+              <a:spcAft>
+                <a:spcPts val="1000"/>
+              </a:spcAft>
               <a:buSzPct val="100000"/>
               <a:buFont typeface="Tahoma"/>
-              <a:buAutoNum type="arabicPeriod"/>
-            </a:pPr>
+              <a:buChar char="■"/>
+            </a:pPr>
+            <a:r>
+              <a:rPr lang="en" sz="2200" i="1">
+                <a:latin typeface="Tahoma"/>
+                <a:ea typeface="Tahoma"/>
+                <a:cs typeface="Tahoma"/>
+                <a:sym typeface="Tahoma"/>
+              </a:rPr>
+              <a:t>r</a:t>
+            </a:r>
+            <a:r>
+              <a:rPr lang="en" sz="2200" i="1" baseline="-25000">
+                <a:latin typeface="Tahoma"/>
+                <a:ea typeface="Tahoma"/>
+                <a:cs typeface="Tahoma"/>
+                <a:sym typeface="Tahoma"/>
+              </a:rPr>
+              <a:t>1</a:t>
+            </a:r>
             <a:r>
               <a:rPr lang="en" sz="2200">
                 <a:latin typeface="Tahoma"/>
@@ -6778,16 +7419,84 @@
                 <a:cs typeface="Tahoma"/>
                 <a:sym typeface="Tahoma"/>
               </a:rPr>
-              <a:t>Привязка (hooking) звёзд к другим деревьям:</a:t>
-            </a:r>
-            <a:br>
+              <a:t> – корень дерева, которому принадлежит </a:t>
+            </a:r>
+            <a:r>
+              <a:rPr lang="en" sz="2200" i="1">
+                <a:latin typeface="Tahoma"/>
+                <a:ea typeface="Tahoma"/>
+                <a:cs typeface="Tahoma"/>
+                <a:sym typeface="Tahoma"/>
+              </a:rPr>
+              <a:t>v</a:t>
+            </a:r>
+            <a:r>
+              <a:rPr lang="en" sz="2200" i="1" baseline="-25000">
+                <a:latin typeface="Tahoma"/>
+                <a:ea typeface="Tahoma"/>
+                <a:cs typeface="Tahoma"/>
+                <a:sym typeface="Tahoma"/>
+              </a:rPr>
+              <a:t>1</a:t>
+            </a:r>
+          </a:p>
+          <a:p>
+            <a:pPr marL="1371600" lvl="2" indent="-368300" rtl="0">
+              <a:spcBef>
+                <a:spcPts val="0"/>
+              </a:spcBef>
+              <a:spcAft>
+                <a:spcPts val="1000"/>
+              </a:spcAft>
+              <a:buSzPct val="100000"/>
+              <a:buFont typeface="Tahoma"/>
+              <a:buChar char="■"/>
+            </a:pPr>
+            <a:r>
+              <a:rPr lang="en" sz="2200" i="1">
+                <a:latin typeface="Tahoma"/>
+                <a:ea typeface="Tahoma"/>
+                <a:cs typeface="Tahoma"/>
+                <a:sym typeface="Tahoma"/>
+              </a:rPr>
+              <a:t>v</a:t>
+            </a:r>
+            <a:r>
+              <a:rPr lang="en" sz="2200" i="1" baseline="-25000">
+                <a:latin typeface="Tahoma"/>
+                <a:ea typeface="Tahoma"/>
+                <a:cs typeface="Tahoma"/>
+                <a:sym typeface="Tahoma"/>
+              </a:rPr>
+              <a:t>1</a:t>
+            </a:r>
+            <a:r>
               <a:rPr lang="en" sz="2200">
                 <a:latin typeface="Tahoma"/>
                 <a:ea typeface="Tahoma"/>
                 <a:cs typeface="Tahoma"/>
                 <a:sym typeface="Tahoma"/>
               </a:rPr>
-            </a:br>
+              <a:t> и </a:t>
+            </a:r>
+            <a:r>
+              <a:rPr lang="en" sz="2200" i="1">
+                <a:latin typeface="Tahoma"/>
+                <a:ea typeface="Tahoma"/>
+                <a:cs typeface="Tahoma"/>
+                <a:sym typeface="Tahoma"/>
+              </a:rPr>
+              <a:t>v</a:t>
+            </a:r>
+            <a:r>
+              <a:rPr lang="en" sz="2200" i="1" baseline="-25000">
+                <a:latin typeface="Tahoma"/>
+                <a:ea typeface="Tahoma"/>
+                <a:cs typeface="Tahoma"/>
+                <a:sym typeface="Tahoma"/>
+              </a:rPr>
+              <a:t>2</a:t>
+            </a:r>
             <a:r>
               <a:rPr lang="en" sz="2200">
                 <a:latin typeface="Tahoma"/>
@@ -6795,7 +7504,7 @@
                 <a:cs typeface="Tahoma"/>
                 <a:sym typeface="Tahoma"/>
               </a:rPr>
-              <a:t>корню каждой звезды назначается в качестве родителя вершина из другого дерева</a:t>
+              <a:t> принадлежат разным деревьям</a:t>
             </a:r>
           </a:p>
         </p:txBody>
@@ -6837,7 +7546,7 @@
             </a:fld>
             <a:r>
               <a:rPr lang="en"/>
-              <a:t>/11</a:t>
+              <a:t>/12</a:t>
             </a:r>
           </a:p>
         </p:txBody>
@@ -6899,7 +7608,7 @@
           </a:bodyPr>
           <a:lstStyle/>
           <a:p>
-            <a:pPr lvl="0" rtl="0">
+            <a:pPr lvl="0">
               <a:spcBef>
                 <a:spcPts val="0"/>
               </a:spcBef>
@@ -6912,7 +7621,7 @@
                 <a:cs typeface="Tahoma"/>
                 <a:sym typeface="Tahoma"/>
               </a:rPr>
-              <a:t>Фундаментальные результаты в области (2)</a:t>
+              <a:t>Алгоритм Шилоха-Вишкина</a:t>
             </a:r>
           </a:p>
         </p:txBody>
@@ -6929,8 +7638,8 @@
         </p:nvSpPr>
         <p:spPr>
           <a:xfrm>
-            <a:off x="311700" y="1152475"/>
-            <a:ext cx="8520600" cy="3696000"/>
+            <a:off x="311700" y="1017725"/>
+            <a:ext cx="8520600" cy="3900000"/>
           </a:xfrm>
           <a:prstGeom prst="rect">
             <a:avLst/>
@@ -6951,7 +7660,7 @@
               </a:spcAft>
               <a:buSzPct val="100000"/>
               <a:buFont typeface="Tahoma"/>
-              <a:buChar char="●"/>
+              <a:buAutoNum type="arabicPeriod"/>
             </a:pPr>
             <a:r>
               <a:rPr lang="en" sz="2200">
@@ -6960,7 +7669,24 @@
                 <a:cs typeface="Tahoma"/>
                 <a:sym typeface="Tahoma"/>
               </a:rPr>
-              <a:t>Awerbuch, Shiloah. New Connectivity and MSF Algorithms for Shuffle-Exchange Network and PRAM (1983)</a:t>
+              <a:t>Short-cut:</a:t>
+            </a:r>
+            <a:br>
+              <a:rPr lang="en" sz="2200">
+                <a:latin typeface="Tahoma"/>
+                <a:ea typeface="Tahoma"/>
+                <a:cs typeface="Tahoma"/>
+                <a:sym typeface="Tahoma"/>
+              </a:rPr>
+            </a:br>
+            <a:r>
+              <a:rPr lang="en" sz="2200" i="1">
+                <a:latin typeface="Tahoma"/>
+                <a:ea typeface="Tahoma"/>
+                <a:cs typeface="Tahoma"/>
+                <a:sym typeface="Tahoma"/>
+              </a:rPr>
+              <a:t>D(v) ← D(D(v))</a:t>
             </a:r>
           </a:p>
           <a:p>
@@ -6973,7 +7699,7 @@
               </a:spcAft>
               <a:buSzPct val="100000"/>
               <a:buFont typeface="Tahoma"/>
-              <a:buChar char="●"/>
+              <a:buAutoNum type="arabicPeriod"/>
             </a:pPr>
             <a:r>
               <a:rPr lang="en" sz="2200">
@@ -6982,7 +7708,42 @@
                 <a:cs typeface="Tahoma"/>
                 <a:sym typeface="Tahoma"/>
               </a:rPr>
-              <a:t>Используются модели SE и PRAM</a:t>
+              <a:t>Hooking:</a:t>
+            </a:r>
+            <a:br>
+              <a:rPr lang="en" sz="2200">
+                <a:latin typeface="Tahoma"/>
+                <a:ea typeface="Tahoma"/>
+                <a:cs typeface="Tahoma"/>
+                <a:sym typeface="Tahoma"/>
+              </a:rPr>
+            </a:br>
+            <a:r>
+              <a:rPr lang="en" sz="2200">
+                <a:latin typeface="Tahoma"/>
+                <a:ea typeface="Tahoma"/>
+                <a:cs typeface="Tahoma"/>
+                <a:sym typeface="Tahoma"/>
+              </a:rPr>
+              <a:t>у каждого ребра </a:t>
+            </a:r>
+            <a:r>
+              <a:rPr lang="en" sz="2200" i="1">
+                <a:latin typeface="Tahoma"/>
+                <a:ea typeface="Tahoma"/>
+                <a:cs typeface="Tahoma"/>
+                <a:sym typeface="Tahoma"/>
+              </a:rPr>
+              <a:t>uv (u ≠ v)</a:t>
+            </a:r>
+            <a:r>
+              <a:rPr lang="en" sz="2200">
+                <a:latin typeface="Tahoma"/>
+                <a:ea typeface="Tahoma"/>
+                <a:cs typeface="Tahoma"/>
+                <a:sym typeface="Tahoma"/>
+              </a:rPr>
+              <a:t> одна из инцидентных вершин меняет родителя</a:t>
             </a:r>
           </a:p>
           <a:p>
@@ -6995,7 +7756,7 @@
               </a:spcAft>
               <a:buSzPct val="100000"/>
               <a:buFont typeface="Tahoma"/>
-              <a:buChar char="●"/>
+              <a:buAutoNum type="arabicPeriod"/>
             </a:pPr>
             <a:r>
               <a:rPr lang="en" sz="2200">
@@ -7004,30 +7765,16 @@
                 <a:cs typeface="Tahoma"/>
                 <a:sym typeface="Tahoma"/>
               </a:rPr>
-              <a:t>Для PRAM: сложность </a:t>
-            </a:r>
-            <a:r>
-              <a:rPr lang="en" sz="2200" i="1">
-                <a:latin typeface="Tahoma"/>
-                <a:ea typeface="Tahoma"/>
-                <a:cs typeface="Tahoma"/>
-                <a:sym typeface="Tahoma"/>
-              </a:rPr>
-              <a:t>O(log n)</a:t>
-            </a:r>
-            <a:r>
+              <a:t>Привязка (hooking) звёзд к другим деревьям:</a:t>
+            </a:r>
+            <a:br>
               <a:rPr lang="en" sz="2200">
                 <a:latin typeface="Tahoma"/>
                 <a:ea typeface="Tahoma"/>
                 <a:cs typeface="Tahoma"/>
                 <a:sym typeface="Tahoma"/>
               </a:rPr>
-              <a:t>, </a:t>
-            </a:r>
-            <a:r>
-              <a:rPr lang="en" sz="2200" i="1"/>
-              <a:t>n + m</a:t>
-            </a:r>
+            </a:br>
             <a:r>
               <a:rPr lang="en" sz="2200">
                 <a:latin typeface="Tahoma"/>
@@ -7035,20 +7782,17 @@
                 <a:cs typeface="Tahoma"/>
                 <a:sym typeface="Tahoma"/>
               </a:rPr>
-              <a:t> процессоров</a:t>
-            </a:r>
-          </a:p>
-          <a:p>
-            <a:pPr marL="457200" lvl="0" indent="-368300" rtl="0">
-              <a:spcBef>
-                <a:spcPts val="0"/>
-              </a:spcBef>
-              <a:spcAft>
-                <a:spcPts val="1000"/>
-              </a:spcAft>
+              <a:t>корню каждой звезды назначается в качестве родителя вершина из другого дерева</a:t>
+            </a:r>
+          </a:p>
+          <a:p>
+            <a:pPr marL="457200" lvl="0" indent="-368300">
+              <a:spcBef>
+                <a:spcPts val="0"/>
+              </a:spcBef>
               <a:buSzPct val="100000"/>
               <a:buFont typeface="Tahoma"/>
-              <a:buChar char="●"/>
+              <a:buAutoNum type="arabicPeriod"/>
             </a:pPr>
             <a:r>
               <a:rPr lang="en" sz="2200">
@@ -7057,7 +7801,7 @@
                 <a:cs typeface="Tahoma"/>
                 <a:sym typeface="Tahoma"/>
               </a:rPr>
-              <a:t>В гонке на запись ячейки памяти побеждает “сильнейший” процессор</a:t>
+              <a:t>Если граф родителей состоит из звёзд, остановка</a:t>
             </a:r>
           </a:p>
         </p:txBody>
@@ -7099,7 +7843,7 @@
             </a:fld>
             <a:r>
               <a:rPr lang="en"/>
-              <a:t>/11</a:t>
+              <a:t>/12</a:t>
             </a:r>
           </a:p>
         </p:txBody>
@@ -7161,7 +7905,7 @@
           </a:bodyPr>
           <a:lstStyle/>
           <a:p>
-            <a:pPr lvl="0">
+            <a:pPr lvl="0" rtl="0">
               <a:spcBef>
                 <a:spcPts val="0"/>
               </a:spcBef>
@@ -7174,22 +7918,8 @@
                 <a:cs typeface="Tahoma"/>
                 <a:sym typeface="Tahoma"/>
               </a:rPr>
-              <a:t>A Fast GPU Algorithm for Graph Connectivity (1)</a:t>
-            </a:r>
-            <a:br>
-              <a:rPr lang="en">
-                <a:latin typeface="Tahoma"/>
-                <a:ea typeface="Tahoma"/>
-                <a:cs typeface="Tahoma"/>
-                <a:sym typeface="Tahoma"/>
-              </a:rPr>
-            </a:br>
-            <a:endParaRPr lang="en">
-              <a:latin typeface="Tahoma"/>
-              <a:ea typeface="Tahoma"/>
-              <a:cs typeface="Tahoma"/>
-              <a:sym typeface="Tahoma"/>
-            </a:endParaRPr>
+              <a:t>Фундаментальные результаты в области (2)</a:t>
+            </a:r>
           </a:p>
         </p:txBody>
       </p:sp>
@@ -7206,7 +7936,7 @@
         <p:spPr>
           <a:xfrm>
             <a:off x="311700" y="1152475"/>
-            <a:ext cx="8520600" cy="3788100"/>
+            <a:ext cx="8520600" cy="3696000"/>
           </a:xfrm>
           <a:prstGeom prst="rect">
             <a:avLst/>
@@ -7236,7 +7966,7 @@
                 <a:cs typeface="Tahoma"/>
                 <a:sym typeface="Tahoma"/>
               </a:rPr>
-              <a:t>J. Soman, K. Kishore, P. J. Narayanan (2010)</a:t>
+              <a:t>Awerbuch, Shiloah. New Connectivity and MSF Algorithms for Shuffle-Exchange Network and PRAM (1983)</a:t>
             </a:r>
           </a:p>
           <a:p>
@@ -7258,55 +7988,11 @@
                 <a:cs typeface="Tahoma"/>
                 <a:sym typeface="Tahoma"/>
               </a:rPr>
-              <a:t>Модификация алгоритма Шилоха-Вишкина:</a:t>
-            </a:r>
-          </a:p>
-          <a:p>
-            <a:pPr marL="914400" lvl="1" indent="-368300" rtl="0">
-              <a:spcBef>
-                <a:spcPts val="0"/>
-              </a:spcBef>
-              <a:spcAft>
-                <a:spcPts val="0"/>
-              </a:spcAft>
-              <a:buSzPct val="100000"/>
-              <a:buFont typeface="Tahoma"/>
-              <a:buChar char="○"/>
-            </a:pPr>
-            <a:r>
-              <a:rPr lang="en" sz="2200">
-                <a:latin typeface="Tahoma"/>
-                <a:ea typeface="Tahoma"/>
-                <a:cs typeface="Tahoma"/>
-                <a:sym typeface="Tahoma"/>
-              </a:rPr>
-              <a:t>привязка корней звёзд только к корням других звёзд</a:t>
-            </a:r>
-          </a:p>
-          <a:p>
-            <a:pPr marL="914400" lvl="1" indent="-368300" rtl="0">
-              <a:spcBef>
-                <a:spcPts val="0"/>
-              </a:spcBef>
-              <a:spcAft>
-                <a:spcPts val="0"/>
-              </a:spcAft>
-              <a:buSzPct val="100000"/>
-              <a:buFont typeface="Tahoma"/>
-              <a:buChar char="○"/>
-            </a:pPr>
-            <a:r>
-              <a:rPr lang="en" sz="2200">
-                <a:latin typeface="Tahoma"/>
-                <a:ea typeface="Tahoma"/>
-                <a:cs typeface="Tahoma"/>
-                <a:sym typeface="Tahoma"/>
-              </a:rPr>
-              <a:t>многоуровневый short-cut (pointer jumping)</a:t>
-            </a:r>
-          </a:p>
-          <a:p>
-            <a:pPr marL="914400" lvl="1" indent="-368300" rtl="0">
+              <a:t>Используются модели SE и PRAM</a:t>
+            </a:r>
+          </a:p>
+          <a:p>
+            <a:pPr marL="457200" lvl="0" indent="-368300" rtl="0">
               <a:spcBef>
                 <a:spcPts val="0"/>
               </a:spcBef>
@@ -7315,7 +8001,7 @@
               </a:spcAft>
               <a:buSzPct val="100000"/>
               <a:buFont typeface="Tahoma"/>
-              <a:buChar char="○"/>
+              <a:buChar char="●"/>
             </a:pPr>
             <a:r>
               <a:rPr lang="en" sz="2200">
@@ -7324,7 +8010,38 @@
                 <a:cs typeface="Tahoma"/>
                 <a:sym typeface="Tahoma"/>
               </a:rPr>
-              <a:t>сокращение графа посредством деактивации рёбер</a:t>
+              <a:t>Для PRAM: сложность </a:t>
+            </a:r>
+            <a:r>
+              <a:rPr lang="en" sz="2200" i="1">
+                <a:latin typeface="Tahoma"/>
+                <a:ea typeface="Tahoma"/>
+                <a:cs typeface="Tahoma"/>
+                <a:sym typeface="Tahoma"/>
+              </a:rPr>
+              <a:t>O(log n)</a:t>
+            </a:r>
+            <a:r>
+              <a:rPr lang="en" sz="2200">
+                <a:latin typeface="Tahoma"/>
+                <a:ea typeface="Tahoma"/>
+                <a:cs typeface="Tahoma"/>
+                <a:sym typeface="Tahoma"/>
+              </a:rPr>
+              <a:t>, </a:t>
+            </a:r>
+            <a:r>
+              <a:rPr lang="en" sz="2200" i="1"/>
+              <a:t>n + m</a:t>
+            </a:r>
+            <a:r>
+              <a:rPr lang="en" sz="2200">
+                <a:latin typeface="Tahoma"/>
+                <a:ea typeface="Tahoma"/>
+                <a:cs typeface="Tahoma"/>
+                <a:sym typeface="Tahoma"/>
+              </a:rPr>
+              <a:t> процессоров</a:t>
             </a:r>
           </a:p>
           <a:p>
@@ -7346,51 +8063,7 @@
                 <a:cs typeface="Tahoma"/>
                 <a:sym typeface="Tahoma"/>
               </a:rPr>
-              <a:t>Оптимизации для GPU</a:t>
-            </a:r>
-          </a:p>
-          <a:p>
-            <a:pPr marL="914400" lvl="1" indent="-368300" rtl="0">
-              <a:spcBef>
-                <a:spcPts val="0"/>
-              </a:spcBef>
-              <a:spcAft>
-                <a:spcPts val="0"/>
-              </a:spcAft>
-              <a:buSzPct val="100000"/>
-              <a:buFont typeface="Tahoma"/>
-              <a:buChar char="○"/>
-            </a:pPr>
-            <a:r>
-              <a:rPr lang="en" sz="2200">
-                <a:latin typeface="Tahoma"/>
-                <a:ea typeface="Tahoma"/>
-                <a:cs typeface="Tahoma"/>
-                <a:sym typeface="Tahoma"/>
-              </a:rPr>
-              <a:t>снижение количество операций чтения из памяти</a:t>
-            </a:r>
-          </a:p>
-          <a:p>
-            <a:pPr marL="914400" lvl="1" indent="-368300" rtl="0">
-              <a:spcBef>
-                <a:spcPts val="0"/>
-              </a:spcBef>
-              <a:spcAft>
-                <a:spcPts val="1000"/>
-              </a:spcAft>
-              <a:buSzPct val="100000"/>
-              <a:buFont typeface="Tahoma"/>
-              <a:buChar char="○"/>
-            </a:pPr>
-            <a:r>
-              <a:rPr lang="en" sz="2200">
-                <a:latin typeface="Tahoma"/>
-                <a:ea typeface="Tahoma"/>
-                <a:cs typeface="Tahoma"/>
-                <a:sym typeface="Tahoma"/>
-              </a:rPr>
-              <a:t>отказ от атомарных операций</a:t>
+              <a:t>В гонке на запись ячейки памяти побеждает “сильнейший” процессор</a:t>
             </a:r>
           </a:p>
         </p:txBody>
@@ -7432,7 +8105,7 @@
             </a:fld>
             <a:r>
               <a:rPr lang="en"/>
-              <a:t>/11</a:t>
+              <a:t>/12</a:t>
             </a:r>
           </a:p>
         </p:txBody>
@@ -7442,13 +8115,6 @@
   <p:clrMapOvr>
     <a:masterClrMapping/>
   </p:clrMapOvr>
-  <p:timing>
-    <p:tnLst>
-      <p:par>
-        <p:cTn id="1" dur="indefinite" restart="never" nodeType="tmRoot"/>
-      </p:par>
-    </p:tnLst>
-  </p:timing>
 </p:sld>
 </file>
 
@@ -7498,11 +8164,6 @@
               <a:spcBef>
                 <a:spcPts val="0"/>
               </a:spcBef>
-              <a:buClr>
-                <a:schemeClr val="dk1"/>
-              </a:buClr>
-              <a:buSzPct val="39285"/>
-              <a:buFont typeface="Arial"/>
               <a:buNone/>
             </a:pPr>
             <a:r>
@@ -7512,8 +8173,22 @@
                 <a:cs typeface="Tahoma"/>
                 <a:sym typeface="Tahoma"/>
               </a:rPr>
-              <a:t>A Fast GPU Algorithm for Graph Connectivity (2)</a:t>
-            </a:r>
+              <a:t>A Fast GPU Algorithm for Graph Connectivity (1)</a:t>
+            </a:r>
+            <a:br>
+              <a:rPr lang="en">
+                <a:latin typeface="Tahoma"/>
+                <a:ea typeface="Tahoma"/>
+                <a:cs typeface="Tahoma"/>
+                <a:sym typeface="Tahoma"/>
+              </a:rPr>
+            </a:br>
+            <a:endParaRPr lang="en">
+              <a:latin typeface="Tahoma"/>
+              <a:ea typeface="Tahoma"/>
+              <a:cs typeface="Tahoma"/>
+              <a:sym typeface="Tahoma"/>
+            </a:endParaRPr>
           </a:p>
         </p:txBody>
       </p:sp>
@@ -7530,7 +8205,7 @@
         <p:spPr>
           <a:xfrm>
             <a:off x="311700" y="1152475"/>
-            <a:ext cx="8520600" cy="3416400"/>
+            <a:ext cx="8520600" cy="3788100"/>
           </a:xfrm>
           <a:prstGeom prst="rect">
             <a:avLst/>
@@ -7542,7 +8217,7 @@
           </a:bodyPr>
           <a:lstStyle/>
           <a:p>
-            <a:pPr marL="457200" lvl="0" indent="-381000" rtl="0">
+            <a:pPr marL="457200" lvl="0" indent="-368300" rtl="0">
               <a:spcBef>
                 <a:spcPts val="0"/>
               </a:spcBef>
@@ -7554,35 +8229,167 @@
               <a:buChar char="●"/>
             </a:pPr>
             <a:r>
-              <a:rPr lang="en" sz="2400">
-                <a:latin typeface="Tahoma"/>
-                <a:ea typeface="Tahoma"/>
-                <a:cs typeface="Tahoma"/>
-                <a:sym typeface="Tahoma"/>
-              </a:rPr>
-              <a:t>J. Soman, K. Kothapalli, P. J. Narayanan. Some GPU algorithms for graph connected components and spanning tree (2010)</a:t>
-            </a:r>
-          </a:p>
-          <a:p>
-            <a:pPr marL="457200" lvl="0" indent="-381000" rtl="0">
+              <a:rPr lang="en" sz="2200">
+                <a:latin typeface="Tahoma"/>
+                <a:ea typeface="Tahoma"/>
+                <a:cs typeface="Tahoma"/>
+                <a:sym typeface="Tahoma"/>
+              </a:rPr>
+              <a:t>J. Soman, K. Kishore, P. J. Narayanan (2010)</a:t>
+            </a:r>
+          </a:p>
+          <a:p>
+            <a:pPr marL="457200" lvl="0" indent="-368300" rtl="0">
               <a:spcBef>
                 <a:spcPts val="0"/>
               </a:spcBef>
               <a:spcAft>
-                <a:spcPts val="0"/>
+                <a:spcPts val="1000"/>
               </a:spcAft>
               <a:buSzPct val="100000"/>
               <a:buFont typeface="Tahoma"/>
               <a:buChar char="●"/>
             </a:pPr>
             <a:r>
-              <a:rPr lang="en" sz="2400">
-                <a:latin typeface="Tahoma"/>
-                <a:ea typeface="Tahoma"/>
-                <a:cs typeface="Tahoma"/>
-                <a:sym typeface="Tahoma"/>
-              </a:rPr>
-              <a:t>L. Wang. An Implementation of Connected Component Algorithm on GPU (2013)</a:t>
+              <a:rPr lang="en" sz="2200">
+                <a:latin typeface="Tahoma"/>
+                <a:ea typeface="Tahoma"/>
+                <a:cs typeface="Tahoma"/>
+                <a:sym typeface="Tahoma"/>
+              </a:rPr>
+              <a:t>Модификация алгоритма Шилоха-Вишкина:</a:t>
+            </a:r>
+          </a:p>
+          <a:p>
+            <a:pPr marL="914400" lvl="1" indent="-368300" rtl="0">
+              <a:spcBef>
+                <a:spcPts val="0"/>
+              </a:spcBef>
+              <a:spcAft>
+                <a:spcPts val="0"/>
+              </a:spcAft>
+              <a:buSzPct val="100000"/>
+              <a:buFont typeface="Tahoma"/>
+              <a:buChar char="○"/>
+            </a:pPr>
+            <a:r>
+              <a:rPr lang="en" sz="2200">
+                <a:latin typeface="Tahoma"/>
+                <a:ea typeface="Tahoma"/>
+                <a:cs typeface="Tahoma"/>
+                <a:sym typeface="Tahoma"/>
+              </a:rPr>
+              <a:t>привязка корней звёзд только к корням других звёзд</a:t>
+            </a:r>
+          </a:p>
+          <a:p>
+            <a:pPr marL="914400" lvl="1" indent="-368300" rtl="0">
+              <a:spcBef>
+                <a:spcPts val="0"/>
+              </a:spcBef>
+              <a:spcAft>
+                <a:spcPts val="0"/>
+              </a:spcAft>
+              <a:buSzPct val="100000"/>
+              <a:buFont typeface="Tahoma"/>
+              <a:buChar char="○"/>
+            </a:pPr>
+            <a:r>
+              <a:rPr lang="en" sz="2200">
+                <a:latin typeface="Tahoma"/>
+                <a:ea typeface="Tahoma"/>
+                <a:cs typeface="Tahoma"/>
+                <a:sym typeface="Tahoma"/>
+              </a:rPr>
+              <a:t>многоуровневый short-cut (pointer jumping)</a:t>
+            </a:r>
+          </a:p>
+          <a:p>
+            <a:pPr marL="914400" lvl="1" indent="-368300" rtl="0">
+              <a:spcBef>
+                <a:spcPts val="0"/>
+              </a:spcBef>
+              <a:spcAft>
+                <a:spcPts val="1000"/>
+              </a:spcAft>
+              <a:buSzPct val="100000"/>
+              <a:buFont typeface="Tahoma"/>
+              <a:buChar char="○"/>
+            </a:pPr>
+            <a:r>
+              <a:rPr lang="en" sz="2200">
+                <a:latin typeface="Tahoma"/>
+                <a:ea typeface="Tahoma"/>
+                <a:cs typeface="Tahoma"/>
+                <a:sym typeface="Tahoma"/>
+              </a:rPr>
+              <a:t>сокращение графа посредством деактивации рёбер</a:t>
+            </a:r>
+          </a:p>
+          <a:p>
+            <a:pPr marL="457200" lvl="0" indent="-368300" rtl="0">
+              <a:spcBef>
+                <a:spcPts val="0"/>
+              </a:spcBef>
+              <a:spcAft>
+                <a:spcPts val="1000"/>
+              </a:spcAft>
+              <a:buSzPct val="100000"/>
+              <a:buFont typeface="Tahoma"/>
+              <a:buChar char="●"/>
+            </a:pPr>
+            <a:r>
+              <a:rPr lang="en" sz="2200">
+                <a:latin typeface="Tahoma"/>
+                <a:ea typeface="Tahoma"/>
+                <a:cs typeface="Tahoma"/>
+                <a:sym typeface="Tahoma"/>
+              </a:rPr>
+              <a:t>Оптимизации для GPU</a:t>
+            </a:r>
+          </a:p>
+          <a:p>
+            <a:pPr marL="914400" lvl="1" indent="-368300" rtl="0">
+              <a:spcBef>
+                <a:spcPts val="0"/>
+              </a:spcBef>
+              <a:spcAft>
+                <a:spcPts val="0"/>
+              </a:spcAft>
+              <a:buSzPct val="100000"/>
+              <a:buFont typeface="Tahoma"/>
+              <a:buChar char="○"/>
+            </a:pPr>
+            <a:r>
+              <a:rPr lang="en" sz="2200">
+                <a:latin typeface="Tahoma"/>
+                <a:ea typeface="Tahoma"/>
+                <a:cs typeface="Tahoma"/>
+                <a:sym typeface="Tahoma"/>
+              </a:rPr>
+              <a:t>снижение количество операций чтения из памяти</a:t>
+            </a:r>
+          </a:p>
+          <a:p>
+            <a:pPr marL="914400" lvl="1" indent="-368300" rtl="0">
+              <a:spcBef>
+                <a:spcPts val="0"/>
+              </a:spcBef>
+              <a:spcAft>
+                <a:spcPts val="1000"/>
+              </a:spcAft>
+              <a:buSzPct val="100000"/>
+              <a:buFont typeface="Tahoma"/>
+              <a:buChar char="○"/>
+            </a:pPr>
+            <a:r>
+              <a:rPr lang="en" sz="2200">
+                <a:latin typeface="Tahoma"/>
+                <a:ea typeface="Tahoma"/>
+                <a:cs typeface="Tahoma"/>
+                <a:sym typeface="Tahoma"/>
+              </a:rPr>
+              <a:t>отказ от атомарных операций</a:t>
             </a:r>
           </a:p>
         </p:txBody>
@@ -7624,7 +8431,7 @@
             </a:fld>
             <a:r>
               <a:rPr lang="en"/>
-              <a:t>/11</a:t>
+              <a:t>/12</a:t>
             </a:r>
           </a:p>
         </p:txBody>
@@ -7634,13 +8441,6 @@
   <p:clrMapOvr>
     <a:masterClrMapping/>
   </p:clrMapOvr>
-  <p:timing>
-    <p:tnLst>
-      <p:par>
-        <p:cTn id="1" dur="indefinite" restart="never" nodeType="tmRoot"/>
-      </p:par>
-    </p:tnLst>
-  </p:timing>
 </p:sld>
 </file>
 
@@ -7690,6 +8490,11 @@
               <a:spcBef>
                 <a:spcPts val="0"/>
               </a:spcBef>
+              <a:buClr>
+                <a:schemeClr val="dk1"/>
+              </a:buClr>
+              <a:buSzPct val="39285"/>
+              <a:buFont typeface="Arial"/>
               <a:buNone/>
             </a:pPr>
             <a:r>
@@ -7699,7 +8504,7 @@
                 <a:cs typeface="Tahoma"/>
                 <a:sym typeface="Tahoma"/>
               </a:rPr>
-              <a:t>A Simple and Practical Linear-Work Parallel Algorithm for Connectivity</a:t>
+              <a:t>A Fast GPU Algorithm for Graph Connectivity (2)</a:t>
             </a:r>
           </a:p>
         </p:txBody>
@@ -7716,8 +8521,8 @@
         </p:nvSpPr>
         <p:spPr>
           <a:xfrm>
-            <a:off x="311700" y="1359300"/>
-            <a:ext cx="8520600" cy="3534600"/>
+            <a:off x="311700" y="1152475"/>
+            <a:ext cx="8520600" cy="3416400"/>
           </a:xfrm>
           <a:prstGeom prst="rect">
             <a:avLst/>
@@ -7729,7 +8534,7 @@
           </a:bodyPr>
           <a:lstStyle/>
           <a:p>
-            <a:pPr marL="457200" lvl="0" indent="-368300" rtl="0">
+            <a:pPr marL="457200" lvl="0" indent="-381000" rtl="0">
               <a:spcBef>
                 <a:spcPts val="0"/>
               </a:spcBef>
@@ -7741,374 +8546,35 @@
               <a:buChar char="●"/>
             </a:pPr>
             <a:r>
-              <a:rPr lang="en" sz="2200">
-                <a:latin typeface="Tahoma"/>
-                <a:ea typeface="Tahoma"/>
-                <a:cs typeface="Tahoma"/>
-                <a:sym typeface="Tahoma"/>
-              </a:rPr>
-              <a:t>J. Shun, L. Dhulipala, G. E. Blelloch (2014)</a:t>
-            </a:r>
-          </a:p>
-          <a:p>
-            <a:pPr marL="457200" lvl="0" indent="-368300" rtl="0">
+              <a:rPr lang="en" sz="2400">
+                <a:latin typeface="Tahoma"/>
+                <a:ea typeface="Tahoma"/>
+                <a:cs typeface="Tahoma"/>
+                <a:sym typeface="Tahoma"/>
+              </a:rPr>
+              <a:t>J. Soman, K. Kothapalli, P. J. Narayanan. Some GPU algorithms for graph connected components and spanning tree (2010)</a:t>
+            </a:r>
+          </a:p>
+          <a:p>
+            <a:pPr marL="457200" lvl="0" indent="-381000" rtl="0">
               <a:spcBef>
                 <a:spcPts val="0"/>
               </a:spcBef>
               <a:spcAft>
-                <a:spcPts val="1000"/>
+                <a:spcPts val="0"/>
               </a:spcAft>
               <a:buSzPct val="100000"/>
               <a:buFont typeface="Tahoma"/>
               <a:buChar char="●"/>
             </a:pPr>
             <a:r>
-              <a:rPr lang="en" sz="2200">
-                <a:latin typeface="Tahoma"/>
-                <a:ea typeface="Tahoma"/>
-                <a:cs typeface="Tahoma"/>
-                <a:sym typeface="Tahoma"/>
-              </a:rPr>
-              <a:t>Рекурсивный алгоритм сложности </a:t>
-            </a:r>
-            <a:r>
-              <a:rPr lang="en" sz="2200" i="1">
-                <a:latin typeface="Tahoma"/>
-                <a:ea typeface="Tahoma"/>
-                <a:cs typeface="Tahoma"/>
-                <a:sym typeface="Tahoma"/>
-              </a:rPr>
-              <a:t>O(m)</a:t>
-            </a:r>
-            <a:r>
-              <a:rPr lang="en" sz="2200">
-                <a:latin typeface="Tahoma"/>
-                <a:ea typeface="Tahoma"/>
-                <a:cs typeface="Tahoma"/>
-                <a:sym typeface="Tahoma"/>
-              </a:rPr>
-              <a:t> и глубины </a:t>
-            </a:r>
-            <a:r>
-              <a:rPr lang="en" sz="2200" i="1">
-                <a:latin typeface="Tahoma"/>
-                <a:ea typeface="Tahoma"/>
-                <a:cs typeface="Tahoma"/>
-                <a:sym typeface="Tahoma"/>
-              </a:rPr>
-              <a:t>O(log</a:t>
-            </a:r>
-            <a:r>
-              <a:rPr lang="en" sz="2200" i="1" baseline="30000">
-                <a:latin typeface="Tahoma"/>
-                <a:ea typeface="Tahoma"/>
-                <a:cs typeface="Tahoma"/>
-                <a:sym typeface="Tahoma"/>
-              </a:rPr>
-              <a:t>3</a:t>
-            </a:r>
-            <a:r>
-              <a:rPr lang="en" sz="2200" i="1">
-                <a:latin typeface="Tahoma"/>
-                <a:ea typeface="Tahoma"/>
-                <a:cs typeface="Tahoma"/>
-                <a:sym typeface="Tahoma"/>
-              </a:rPr>
-              <a:t> n)</a:t>
-            </a:r>
-          </a:p>
-          <a:p>
-            <a:pPr marL="457200" lvl="0" indent="-368300" rtl="0">
-              <a:spcBef>
-                <a:spcPts val="0"/>
-              </a:spcBef>
-              <a:spcAft>
-                <a:spcPts val="0"/>
-              </a:spcAft>
-              <a:buSzPct val="100000"/>
-              <a:buFont typeface="Tahoma"/>
-              <a:buChar char="●"/>
-            </a:pPr>
-            <a:r>
-              <a:rPr lang="en" sz="2200" i="1">
-                <a:latin typeface="Tahoma"/>
-                <a:ea typeface="Tahoma"/>
-                <a:cs typeface="Tahoma"/>
-                <a:sym typeface="Tahoma"/>
-              </a:rPr>
-              <a:t>(β, d)</a:t>
-            </a:r>
-            <a:r>
-              <a:rPr lang="en" sz="2200">
-                <a:latin typeface="Tahoma"/>
-                <a:ea typeface="Tahoma"/>
-                <a:cs typeface="Tahoma"/>
-                <a:sym typeface="Tahoma"/>
-              </a:rPr>
-              <a:t>-разложение графа V </a:t>
-            </a:r>
-            <a:r>
-              <a:rPr lang="en" sz="2200" i="1">
-                <a:latin typeface="Tahoma"/>
-                <a:ea typeface="Tahoma"/>
-                <a:cs typeface="Tahoma"/>
-                <a:sym typeface="Tahoma"/>
-              </a:rPr>
-              <a:t>(0 &lt; β &lt; 1)</a:t>
-            </a:r>
-            <a:r>
-              <a:rPr lang="en" sz="2200">
-                <a:latin typeface="Tahoma"/>
-                <a:ea typeface="Tahoma"/>
-                <a:cs typeface="Tahoma"/>
-                <a:sym typeface="Tahoma"/>
-              </a:rPr>
-              <a:t> – V</a:t>
-            </a:r>
-            <a:r>
-              <a:rPr lang="en" sz="2200" baseline="-25000">
-                <a:latin typeface="Tahoma"/>
-                <a:ea typeface="Tahoma"/>
-                <a:cs typeface="Tahoma"/>
-                <a:sym typeface="Tahoma"/>
-              </a:rPr>
-              <a:t>1</a:t>
-            </a:r>
-            <a:r>
-              <a:rPr lang="en" sz="2200">
-                <a:latin typeface="Tahoma"/>
-                <a:ea typeface="Tahoma"/>
-                <a:cs typeface="Tahoma"/>
-                <a:sym typeface="Tahoma"/>
-              </a:rPr>
-              <a:t>, …, V</a:t>
-            </a:r>
-            <a:r>
-              <a:rPr lang="en" sz="2200" baseline="-25000">
-                <a:latin typeface="Tahoma"/>
-                <a:ea typeface="Tahoma"/>
-                <a:cs typeface="Tahoma"/>
-                <a:sym typeface="Tahoma"/>
-              </a:rPr>
-              <a:t>k</a:t>
-            </a:r>
-            <a:r>
-              <a:rPr lang="en" sz="2200">
-                <a:latin typeface="Tahoma"/>
-                <a:ea typeface="Tahoma"/>
-                <a:cs typeface="Tahoma"/>
-                <a:sym typeface="Tahoma"/>
-              </a:rPr>
-              <a:t>:</a:t>
-            </a:r>
-          </a:p>
-          <a:p>
-            <a:pPr marL="914400" lvl="1" indent="-368300" rtl="0">
-              <a:spcBef>
-                <a:spcPts val="0"/>
-              </a:spcBef>
-              <a:spcAft>
-                <a:spcPts val="0"/>
-              </a:spcAft>
-              <a:buSzPct val="100000"/>
-              <a:buFont typeface="Tahoma"/>
-              <a:buChar char="○"/>
-            </a:pPr>
-            <a:r>
-              <a:rPr lang="en" sz="2200">
-                <a:latin typeface="Tahoma"/>
-                <a:ea typeface="Tahoma"/>
-                <a:cs typeface="Tahoma"/>
-                <a:sym typeface="Tahoma"/>
-              </a:rPr>
-              <a:t>кратчайший путь между вершинами в V</a:t>
-            </a:r>
-            <a:r>
-              <a:rPr lang="en" sz="2200" baseline="-25000">
-                <a:latin typeface="Tahoma"/>
-                <a:ea typeface="Tahoma"/>
-                <a:cs typeface="Tahoma"/>
-                <a:sym typeface="Tahoma"/>
-              </a:rPr>
-              <a:t>i</a:t>
-            </a:r>
-            <a:r>
-              <a:rPr lang="en" sz="2200">
-                <a:latin typeface="Tahoma"/>
-                <a:ea typeface="Tahoma"/>
-                <a:cs typeface="Tahoma"/>
-                <a:sym typeface="Tahoma"/>
-              </a:rPr>
-              <a:t> не длиннее </a:t>
-            </a:r>
-            <a:r>
-              <a:rPr lang="en" sz="2200" i="1">
-                <a:latin typeface="Tahoma"/>
-                <a:ea typeface="Tahoma"/>
-                <a:cs typeface="Tahoma"/>
-                <a:sym typeface="Tahoma"/>
-              </a:rPr>
-              <a:t>d</a:t>
-            </a:r>
-          </a:p>
-          <a:p>
-            <a:pPr marL="914400" lvl="1" indent="-368300" rtl="0">
-              <a:spcBef>
-                <a:spcPts val="0"/>
-              </a:spcBef>
-              <a:spcAft>
-                <a:spcPts val="0"/>
-              </a:spcAft>
-              <a:buSzPct val="100000"/>
-              <a:buFont typeface="Tahoma"/>
-              <a:buChar char="○"/>
-            </a:pPr>
-            <a:r>
-              <a:rPr lang="en" sz="2200">
-                <a:latin typeface="Tahoma"/>
-                <a:ea typeface="Tahoma"/>
-                <a:cs typeface="Tahoma"/>
-                <a:sym typeface="Tahoma"/>
-              </a:rPr>
-              <a:t>в разных V</a:t>
-            </a:r>
-            <a:r>
-              <a:rPr lang="en" sz="2200" baseline="-25000">
-                <a:latin typeface="Tahoma"/>
-                <a:ea typeface="Tahoma"/>
-                <a:cs typeface="Tahoma"/>
-                <a:sym typeface="Tahoma"/>
-              </a:rPr>
-              <a:t>i</a:t>
-            </a:r>
-            <a:r>
-              <a:rPr lang="en" sz="2200">
-                <a:latin typeface="Tahoma"/>
-                <a:ea typeface="Tahoma"/>
-                <a:cs typeface="Tahoma"/>
-                <a:sym typeface="Tahoma"/>
-              </a:rPr>
-              <a:t>, V</a:t>
-            </a:r>
-            <a:r>
-              <a:rPr lang="en" sz="2200" baseline="-25000">
-                <a:latin typeface="Tahoma"/>
-                <a:ea typeface="Tahoma"/>
-                <a:cs typeface="Tahoma"/>
-                <a:sym typeface="Tahoma"/>
-              </a:rPr>
-              <a:t>j</a:t>
-            </a:r>
-            <a:r>
-              <a:rPr lang="en" sz="2200">
-                <a:latin typeface="Tahoma"/>
-                <a:ea typeface="Tahoma"/>
-                <a:cs typeface="Tahoma"/>
-                <a:sym typeface="Tahoma"/>
-              </a:rPr>
-              <a:t> лежат концы не более </a:t>
-            </a:r>
-            <a:r>
-              <a:rPr lang="en" sz="2400" i="1">
-                <a:latin typeface="Tahoma"/>
-                <a:ea typeface="Tahoma"/>
-                <a:cs typeface="Tahoma"/>
-                <a:sym typeface="Tahoma"/>
-              </a:rPr>
-              <a:t>βm</a:t>
-            </a:r>
-            <a:r>
               <a:rPr lang="en" sz="2400">
                 <a:latin typeface="Tahoma"/>
                 <a:ea typeface="Tahoma"/>
                 <a:cs typeface="Tahoma"/>
                 <a:sym typeface="Tahoma"/>
               </a:rPr>
-              <a:t> рёбер</a:t>
-            </a:r>
-          </a:p>
-          <a:p>
-            <a:pPr marL="457200" lvl="0" indent="-381000" rtl="0">
-              <a:spcBef>
-                <a:spcPts val="0"/>
-              </a:spcBef>
-              <a:spcAft>
-                <a:spcPts val="0"/>
-              </a:spcAft>
-              <a:buSzPct val="100000"/>
-              <a:buFont typeface="Tahoma"/>
-              <a:buChar char="●"/>
-            </a:pPr>
-            <a:r>
-              <a:rPr lang="en" sz="2400">
-                <a:latin typeface="Tahoma"/>
-                <a:ea typeface="Tahoma"/>
-                <a:cs typeface="Tahoma"/>
-                <a:sym typeface="Tahoma"/>
-              </a:rPr>
-              <a:t>Реализации </a:t>
-            </a:r>
-            <a:r>
-              <a:rPr lang="en" sz="2200" i="1">
-                <a:latin typeface="Tahoma"/>
-                <a:ea typeface="Tahoma"/>
-                <a:cs typeface="Tahoma"/>
-                <a:sym typeface="Tahoma"/>
-              </a:rPr>
-              <a:t>(β, d)</a:t>
-            </a:r>
-            <a:r>
-              <a:rPr lang="en" sz="2200">
-                <a:latin typeface="Tahoma"/>
-                <a:ea typeface="Tahoma"/>
-                <a:cs typeface="Tahoma"/>
-                <a:sym typeface="Tahoma"/>
-              </a:rPr>
-              <a:t>-разложения:</a:t>
-            </a:r>
-          </a:p>
-          <a:p>
-            <a:pPr marL="914400" lvl="1" indent="-368300" rtl="0">
-              <a:spcBef>
-                <a:spcPts val="0"/>
-              </a:spcBef>
-              <a:spcAft>
-                <a:spcPts val="0"/>
-              </a:spcAft>
-              <a:buSzPct val="100000"/>
-              <a:buFont typeface="Tahoma"/>
-              <a:buChar char="○"/>
-            </a:pPr>
-            <a:r>
-              <a:rPr lang="en" sz="2200">
-                <a:latin typeface="Tahoma"/>
-                <a:ea typeface="Tahoma"/>
-                <a:cs typeface="Tahoma"/>
-                <a:sym typeface="Tahoma"/>
-              </a:rPr>
-              <a:t>параллельный (покомпонентно) BFS</a:t>
-            </a:r>
-          </a:p>
-          <a:p>
-            <a:pPr marL="914400" lvl="1" indent="-368300" rtl="0">
-              <a:spcBef>
-                <a:spcPts val="0"/>
-              </a:spcBef>
-              <a:spcAft>
-                <a:spcPts val="0"/>
-              </a:spcAft>
-              <a:buSzPct val="100000"/>
-              <a:buFont typeface="Tahoma"/>
-              <a:buChar char="○"/>
-            </a:pPr>
-            <a:r>
-              <a:rPr lang="en" sz="2200">
-                <a:latin typeface="Tahoma"/>
-                <a:ea typeface="Tahoma"/>
-                <a:cs typeface="Tahoma"/>
-                <a:sym typeface="Tahoma"/>
-              </a:rPr>
-              <a:t>две оптимизации параллельного BFS</a:t>
+              <a:t>L. Wang. An Implementation of Connected Component Algorithm on GPU (2013)</a:t>
             </a:r>
           </a:p>
         </p:txBody>
@@ -8150,7 +8616,7 @@
             </a:fld>
             <a:r>
               <a:rPr lang="en"/>
-              <a:t>/11</a:t>
+              <a:t>/12</a:t>
             </a:r>
           </a:p>
         </p:txBody>
@@ -8160,13 +8626,6 @@
   <p:clrMapOvr>
     <a:masterClrMapping/>
   </p:clrMapOvr>
-  <p:timing>
-    <p:tnLst>
-      <p:par>
-        <p:cTn id="1" dur="indefinite" restart="never" nodeType="tmRoot"/>
-      </p:par>
-    </p:tnLst>
-  </p:timing>
 </p:sld>
 </file>
 

</xml_diff>

<commit_message>
Fix slide 6 in Connected components survey report
</commit_message>
<xml_diff>
--- a/2017/GT/SmirenkoKirill/Connected components.pptx
+++ b/2017/GT/SmirenkoKirill/Connected components.pptx
@@ -6669,6 +6669,13 @@
   <p:clrMapOvr>
     <a:masterClrMapping/>
   </p:clrMapOvr>
+  <p:timing>
+    <p:tnLst>
+      <p:par>
+        <p:cTn id="1" dur="indefinite" restart="never" nodeType="tmRoot"/>
+      </p:par>
+    </p:tnLst>
+  </p:timing>
 </p:sld>
 </file>
 
@@ -6853,6 +6860,13 @@
   <p:clrMapOvr>
     <a:masterClrMapping/>
   </p:clrMapOvr>
+  <p:timing>
+    <p:tnLst>
+      <p:par>
+        <p:cTn id="1" dur="indefinite" restart="never" nodeType="tmRoot"/>
+      </p:par>
+    </p:tnLst>
+  </p:timing>
 </p:sld>
 </file>
 
@@ -7135,6 +7149,13 @@
   <p:clrMapOvr>
     <a:masterClrMapping/>
   </p:clrMapOvr>
+  <p:timing>
+    <p:tnLst>
+      <p:par>
+        <p:cTn id="1" dur="indefinite" restart="never" nodeType="tmRoot"/>
+      </p:par>
+    </p:tnLst>
+  </p:timing>
 </p:sld>
 </file>
 
@@ -7690,82 +7711,86 @@
             </a:r>
           </a:p>
           <a:p>
-            <a:pPr marL="457200" lvl="0" indent="-368300" rtl="0">
-              <a:spcBef>
-                <a:spcPts val="0"/>
-              </a:spcBef>
+            <a:pPr marL="457200" lvl="0" indent="-368300">
               <a:spcAft>
                 <a:spcPts val="1000"/>
               </a:spcAft>
-              <a:buSzPct val="100000"/>
               <a:buFont typeface="Tahoma"/>
               <a:buAutoNum type="arabicPeriod"/>
             </a:pPr>
             <a:r>
-              <a:rPr lang="en" sz="2200">
-                <a:latin typeface="Tahoma"/>
-                <a:ea typeface="Tahoma"/>
-                <a:cs typeface="Tahoma"/>
-                <a:sym typeface="Tahoma"/>
-              </a:rPr>
-              <a:t>Hooking:</a:t>
+              <a:rPr lang="ru-RU" sz="2400"/>
+              <a:t>Hooking для каждого ребра </a:t>
+            </a:r>
+            <a:r>
+              <a:rPr lang="ru-RU" sz="2400" i="1"/>
+              <a:t>uv (u ≠ v)</a:t>
+            </a:r>
+            <a:r>
+              <a:rPr lang="ru-RU" sz="2400"/>
+              <a:t>:</a:t>
             </a:r>
             <a:br>
-              <a:rPr lang="en" sz="2200">
-                <a:latin typeface="Tahoma"/>
-                <a:ea typeface="Tahoma"/>
-                <a:cs typeface="Tahoma"/>
-                <a:sym typeface="Tahoma"/>
-              </a:rPr>
+              <a:rPr lang="ru-RU" sz="2400"/>
             </a:br>
             <a:r>
-              <a:rPr lang="en" sz="2200">
-                <a:latin typeface="Tahoma"/>
-                <a:ea typeface="Tahoma"/>
-                <a:cs typeface="Tahoma"/>
-                <a:sym typeface="Tahoma"/>
-              </a:rPr>
-              <a:t>у каждого ребра </a:t>
-            </a:r>
-            <a:r>
-              <a:rPr lang="en" sz="2200" i="1">
-                <a:latin typeface="Tahoma"/>
-                <a:ea typeface="Tahoma"/>
-                <a:cs typeface="Tahoma"/>
-                <a:sym typeface="Tahoma"/>
-              </a:rPr>
-              <a:t>uv (u ≠ v)</a:t>
-            </a:r>
-            <a:r>
-              <a:rPr lang="en" sz="2200">
-                <a:latin typeface="Tahoma"/>
-                <a:ea typeface="Tahoma"/>
-                <a:cs typeface="Tahoma"/>
-                <a:sym typeface="Tahoma"/>
-              </a:rPr>
-              <a:t> одна из инцидентных вершин меняет родителя</a:t>
-            </a:r>
-          </a:p>
-          <a:p>
-            <a:pPr marL="457200" lvl="0" indent="-368300" rtl="0">
-              <a:spcBef>
-                <a:spcPts val="0"/>
-              </a:spcBef>
+              <a:rPr lang="ru-RU" sz="2400"/>
+              <a:t>если </a:t>
+            </a:r>
+            <a:r>
+              <a:rPr lang="ru-RU" sz="2400" i="1"/>
+              <a:t>D(u)</a:t>
+            </a:r>
+            <a:r>
+              <a:rPr lang="ru-RU" sz="2400"/>
+              <a:t> – корень и </a:t>
+            </a:r>
+            <a:r>
+              <a:rPr lang="ru-RU" sz="2400" i="1"/>
+              <a:t>D(v) &lt; D(u)</a:t>
+            </a:r>
+            <a:r>
+              <a:rPr lang="ru-RU" sz="2400"/>
+              <a:t>, то </a:t>
+            </a:r>
+            <a:r>
+              <a:rPr lang="ru-RU" sz="2400" i="1"/>
+              <a:t>D(D(u)) ← </a:t>
+            </a:r>
+            <a:r>
+              <a:rPr lang="ru-RU" sz="2400" i="1"/>
+              <a:t>D(v</a:t>
+            </a:r>
+            <a:r>
+              <a:rPr lang="ru-RU" sz="2400" i="1" smtClean="0"/>
+              <a:t>)</a:t>
+            </a:r>
+          </a:p>
+          <a:p>
+            <a:pPr marL="457200" lvl="0" indent="-368300">
               <a:spcAft>
                 <a:spcPts val="1000"/>
               </a:spcAft>
-              <a:buSzPct val="100000"/>
               <a:buFont typeface="Tahoma"/>
               <a:buAutoNum type="arabicPeriod"/>
             </a:pPr>
             <a:r>
+              <a:rPr lang="en" sz="2200" smtClean="0">
+                <a:latin typeface="Tahoma"/>
+                <a:ea typeface="Tahoma"/>
+                <a:cs typeface="Tahoma"/>
+                <a:sym typeface="Tahoma"/>
+              </a:rPr>
+              <a:t>Привязка </a:t>
+            </a:r>
+            <a:r>
               <a:rPr lang="en" sz="2200">
                 <a:latin typeface="Tahoma"/>
                 <a:ea typeface="Tahoma"/>
                 <a:cs typeface="Tahoma"/>
                 <a:sym typeface="Tahoma"/>
               </a:rPr>
-              <a:t>Привязка (hooking) звёзд к другим деревьям:</a:t>
+              <a:t>(hooking) звёзд к другим деревьям:</a:t>
             </a:r>
             <a:br>
               <a:rPr lang="en" sz="2200">
@@ -8115,6 +8140,13 @@
   <p:clrMapOvr>
     <a:masterClrMapping/>
   </p:clrMapOvr>
+  <p:timing>
+    <p:tnLst>
+      <p:par>
+        <p:cTn id="1" dur="indefinite" restart="never" nodeType="tmRoot"/>
+      </p:par>
+    </p:tnLst>
+  </p:timing>
 </p:sld>
 </file>
 

</xml_diff>